<commit_message>
final draft of lesson 4
</commit_message>
<xml_diff>
--- a/Slides/Lesson 4.4 Debugging.pptx
+++ b/Slides/Lesson 4.4 Debugging.pptx
@@ -5,7 +5,7 @@
     <p:sldMasterId id="2147483648" r:id="rId1"/>
   </p:sldMasterIdLst>
   <p:notesMasterIdLst>
-    <p:notesMasterId r:id="rId14"/>
+    <p:notesMasterId r:id="rId18"/>
   </p:notesMasterIdLst>
   <p:sldIdLst>
     <p:sldId id="256" r:id="rId2"/>
@@ -19,28 +19,32 @@
     <p:sldId id="311" r:id="rId10"/>
     <p:sldId id="310" r:id="rId11"/>
     <p:sldId id="312" r:id="rId12"/>
-    <p:sldId id="303" r:id="rId13"/>
+    <p:sldId id="313" r:id="rId13"/>
+    <p:sldId id="314" r:id="rId14"/>
+    <p:sldId id="315" r:id="rId15"/>
+    <p:sldId id="316" r:id="rId16"/>
+    <p:sldId id="303" r:id="rId17"/>
   </p:sldIdLst>
   <p:sldSz cx="12192000" cy="6858000"/>
   <p:notesSz cx="6858000" cy="9144000"/>
   <p:embeddedFontLst>
     <p:embeddedFont>
       <p:font typeface="Andale Mono" panose="020B0509000000000004" pitchFamily="49" charset="0"/>
-      <p:regular r:id="rId15"/>
+      <p:regular r:id="rId19"/>
     </p:embeddedFont>
     <p:embeddedFont>
       <p:font typeface="Calibri" panose="020F0502020204030204" pitchFamily="34" charset="0"/>
-      <p:regular r:id="rId16"/>
-      <p:bold r:id="rId17"/>
-      <p:italic r:id="rId18"/>
-      <p:boldItalic r:id="rId19"/>
-    </p:embeddedFont>
-    <p:embeddedFont>
-      <p:font typeface="Verdana" panose="020B0604030504040204" pitchFamily="34" charset="0"/>
       <p:regular r:id="rId20"/>
       <p:bold r:id="rId21"/>
       <p:italic r:id="rId22"/>
       <p:boldItalic r:id="rId23"/>
+    </p:embeddedFont>
+    <p:embeddedFont>
+      <p:font typeface="Verdana" panose="020B0604030504040204" pitchFamily="34" charset="0"/>
+      <p:regular r:id="rId24"/>
+      <p:bold r:id="rId25"/>
+      <p:italic r:id="rId26"/>
+      <p:boldItalic r:id="rId27"/>
     </p:embeddedFont>
   </p:embeddedFontLst>
   <p:defaultTextStyle>
@@ -228,7 +232,7 @@
           <a:p>
             <a:fld id="{7C7E5181-6CF5-45F7-A87A-E0E0B1FD7549}" type="datetimeFigureOut">
               <a:rPr lang="en-US" smtClean="0"/>
-              <a:t>2/2/22</a:t>
+              <a:t>2/4/22</a:t>
             </a:fld>
             <a:endParaRPr lang="en-US"/>
           </a:p>
@@ -539,87 +543,7 @@
           <a:bodyPr/>
           <a:lstStyle/>
           <a:p>
-            <a:r>
-              <a:rPr lang="en-US" dirty="0"/>
-              <a:t>Consider an example of debugging HW2: You are failing some test on </a:t>
-            </a:r>
-            <a:r>
-              <a:rPr lang="en-US" dirty="0" err="1"/>
-              <a:t>gradescope</a:t>
-            </a:r>
-            <a:r>
-              <a:rPr lang="en-US" dirty="0"/>
-              <a:t>. The test tells you what it is checking for. You have two options:</a:t>
-            </a:r>
-          </a:p>
-          <a:p>
-            <a:r>
-              <a:rPr lang="en-US" dirty="0"/>
-              <a:t>1. Keep making changes and upload to </a:t>
-            </a:r>
-            <a:r>
-              <a:rPr lang="en-US" dirty="0" err="1"/>
-              <a:t>gradescope</a:t>
-            </a:r>
-            <a:r>
-              <a:rPr lang="en-US" dirty="0"/>
-              <a:t>. It will require you to switch to terminal, run </a:t>
-            </a:r>
-            <a:r>
-              <a:rPr lang="en-US" dirty="0" err="1"/>
-              <a:t>npm</a:t>
-            </a:r>
-            <a:r>
-              <a:rPr lang="en-US" dirty="0"/>
-              <a:t> run zip, open </a:t>
-            </a:r>
-            <a:r>
-              <a:rPr lang="en-US" dirty="0" err="1"/>
-              <a:t>gradescope</a:t>
-            </a:r>
-            <a:r>
-              <a:rPr lang="en-US" dirty="0"/>
-              <a:t>, upload zip, wait for </a:t>
-            </a:r>
-            <a:r>
-              <a:rPr lang="en-US" dirty="0" err="1"/>
-              <a:t>autograder</a:t>
-            </a:r>
-            <a:r>
-              <a:rPr lang="en-US" dirty="0"/>
-              <a:t> to run, then get the results, scroll through page to find the test you were interested in. And you can’t see console output. (we hide that on purpose, to discourage debugging-by-</a:t>
-            </a:r>
-            <a:r>
-              <a:rPr lang="en-US" dirty="0" err="1"/>
-              <a:t>console.log</a:t>
-            </a:r>
-            <a:r>
-              <a:rPr lang="en-US" dirty="0"/>
-              <a:t> on </a:t>
-            </a:r>
-            <a:r>
-              <a:rPr lang="en-US" dirty="0" err="1"/>
-              <a:t>gradescope</a:t>
-            </a:r>
-            <a:r>
-              <a:rPr lang="en-US" dirty="0"/>
-              <a:t>!)</a:t>
-            </a:r>
-          </a:p>
-          <a:p>
-            <a:r>
-              <a:rPr lang="en-US" dirty="0"/>
-              <a:t>2. Write a simple test that you can run locally in VSC by hitting F12, or whatever keystroke you have set. The test doesn’t even need to have an assertion – that would be GREAT, but if it’s faster to just get something that shows some output that you can quickly look at, then huzzah!</a:t>
-            </a:r>
-          </a:p>
-          <a:p>
             <a:endParaRPr lang="en-US" dirty="0"/>
-          </a:p>
-          <a:p>
-            <a:r>
-              <a:rPr lang="en-US" dirty="0"/>
-              <a:t>More broadly, making it more efficient to reproduce the problem might also involve adding log messages so that it’s easier to tell when the problem manifests</a:t>
-            </a:r>
           </a:p>
         </p:txBody>
       </p:sp>
@@ -640,7 +564,7 @@
           <a:p>
             <a:fld id="{07937F07-1250-4CCE-B198-1B2887014F41}" type="slidenum">
               <a:rPr lang="en-US" smtClean="0"/>
-              <a:t>4</a:t>
+              <a:t>2</a:t>
             </a:fld>
             <a:endParaRPr lang="en-US"/>
           </a:p>
@@ -649,7 +573,584 @@
     </p:spTree>
     <p:extLst>
       <p:ext uri="{BB962C8B-B14F-4D97-AF65-F5344CB8AC3E}">
-        <p14:creationId xmlns:p14="http://schemas.microsoft.com/office/powerpoint/2010/main" val="1143051979"/>
+        <p14:creationId xmlns:p14="http://schemas.microsoft.com/office/powerpoint/2010/main" val="2924564220"/>
+      </p:ext>
+    </p:extLst>
+  </p:cSld>
+  <p:clrMapOvr>
+    <a:masterClrMapping/>
+  </p:clrMapOvr>
+</p:notes>
+</file>
+
+<file path=ppt/notesSlides/notesSlide10.xml><?xml version="1.0" encoding="utf-8"?>
+<p:notes xmlns:a="http://schemas.openxmlformats.org/drawingml/2006/main" xmlns:r="http://schemas.openxmlformats.org/officeDocument/2006/relationships" xmlns:p="http://schemas.openxmlformats.org/presentationml/2006/main">
+  <p:cSld>
+    <p:spTree>
+      <p:nvGrpSpPr>
+        <p:cNvPr id="1" name=""/>
+        <p:cNvGrpSpPr/>
+        <p:nvPr/>
+      </p:nvGrpSpPr>
+      <p:grpSpPr>
+        <a:xfrm>
+          <a:off x="0" y="0"/>
+          <a:ext cx="0" cy="0"/>
+          <a:chOff x="0" y="0"/>
+          <a:chExt cx="0" cy="0"/>
+        </a:xfrm>
+      </p:grpSpPr>
+      <p:sp>
+        <p:nvSpPr>
+          <p:cNvPr id="2" name="Slide Image Placeholder 1"/>
+          <p:cNvSpPr>
+            <a:spLocks noGrp="1" noRot="1" noChangeAspect="1"/>
+          </p:cNvSpPr>
+          <p:nvPr>
+            <p:ph type="sldImg"/>
+          </p:nvPr>
+        </p:nvSpPr>
+        <p:spPr/>
+      </p:sp>
+      <p:sp>
+        <p:nvSpPr>
+          <p:cNvPr id="3" name="Notes Placeholder 2"/>
+          <p:cNvSpPr>
+            <a:spLocks noGrp="1"/>
+          </p:cNvSpPr>
+          <p:nvPr>
+            <p:ph type="body" idx="1"/>
+          </p:nvPr>
+        </p:nvSpPr>
+        <p:spPr/>
+        <p:txBody>
+          <a:bodyPr/>
+          <a:lstStyle/>
+          <a:p>
+            <a:r>
+              <a:rPr lang="en-US" dirty="0"/>
+              <a:t>This is the formal strategy for “Add </a:t>
+            </a:r>
+            <a:r>
+              <a:rPr lang="en-US" dirty="0" err="1"/>
+              <a:t>printlns</a:t>
+            </a:r>
+            <a:r>
+              <a:rPr lang="en-US" dirty="0"/>
+              <a:t>”</a:t>
+            </a:r>
+          </a:p>
+          <a:p>
+            <a:endParaRPr lang="en-US" dirty="0"/>
+          </a:p>
+          <a:p>
+            <a:r>
+              <a:rPr lang="en-US" dirty="0"/>
+              <a:t>Some might say that “Logging statements are only used by those who don’t know how to use a debugger.” There are, however, a variety of cases where a log might be more useful than an interactive debugger, for example, if you have a bug that occurs non-deterministically (so called “heisenbugs”). If the bug only shows up on 1 out of 100 executions, it might be more productive to add a logging statement to help you understand WHY it only happens on those 1 out of 100, and then focus on reproducing and fixing that with a debugger.</a:t>
+            </a:r>
+          </a:p>
+          <a:p>
+            <a:endParaRPr lang="en-US" dirty="0"/>
+          </a:p>
+          <a:p>
+            <a:r>
+              <a:rPr lang="en-US" dirty="0"/>
+              <a:t>For example, the log messages on the right are quite verbose, but Prof Bell found them to be useful when debugging an issue with code that connects GitHub Actions’ continuous integration framework with </a:t>
+            </a:r>
+            <a:r>
+              <a:rPr lang="en-US" dirty="0" err="1"/>
+              <a:t>Northeastern’s</a:t>
+            </a:r>
+            <a:r>
+              <a:rPr lang="en-US" dirty="0"/>
+              <a:t> </a:t>
+            </a:r>
+            <a:r>
+              <a:rPr lang="en-US" dirty="0" err="1"/>
+              <a:t>Slurm</a:t>
+            </a:r>
+            <a:r>
+              <a:rPr lang="en-US" dirty="0"/>
+              <a:t> high performance computing cluster. There are many small applications that need to function successfully for this to work, and adding logging messages to each microservice was easier than attaching a debugger to all of them.</a:t>
+            </a:r>
+          </a:p>
+          <a:p>
+            <a:endParaRPr lang="en-US" dirty="0"/>
+          </a:p>
+          <a:p>
+            <a:r>
+              <a:rPr lang="en-US" dirty="0"/>
+              <a:t>Well-written log messages (for instance, those that are found to be most useful when debugging, and are configurable to be disabled when not debugging) also serve to create a useful artifact for future you (or someone else) who needs to debug other issues related to what you are fixing now: the log messages will already be in place! This is a good argument for using a configurable </a:t>
+            </a:r>
+            <a:r>
+              <a:rPr lang="en-US"/>
+              <a:t>logging library.</a:t>
+            </a:r>
+            <a:endParaRPr lang="en-US" dirty="0"/>
+          </a:p>
+        </p:txBody>
+      </p:sp>
+      <p:sp>
+        <p:nvSpPr>
+          <p:cNvPr id="4" name="Slide Number Placeholder 3"/>
+          <p:cNvSpPr>
+            <a:spLocks noGrp="1"/>
+          </p:cNvSpPr>
+          <p:nvPr>
+            <p:ph type="sldNum" sz="quarter" idx="5"/>
+          </p:nvPr>
+        </p:nvSpPr>
+        <p:spPr/>
+        <p:txBody>
+          <a:bodyPr/>
+          <a:lstStyle/>
+          <a:p>
+            <a:fld id="{07937F07-1250-4CCE-B198-1B2887014F41}" type="slidenum">
+              <a:rPr lang="en-US" smtClean="0"/>
+              <a:t>11</a:t>
+            </a:fld>
+            <a:endParaRPr lang="en-US"/>
+          </a:p>
+        </p:txBody>
+      </p:sp>
+    </p:spTree>
+    <p:extLst>
+      <p:ext uri="{BB962C8B-B14F-4D97-AF65-F5344CB8AC3E}">
+        <p14:creationId xmlns:p14="http://schemas.microsoft.com/office/powerpoint/2010/main" val="2403984190"/>
+      </p:ext>
+    </p:extLst>
+  </p:cSld>
+  <p:clrMapOvr>
+    <a:masterClrMapping/>
+  </p:clrMapOvr>
+</p:notes>
+</file>
+
+<file path=ppt/notesSlides/notesSlide11.xml><?xml version="1.0" encoding="utf-8"?>
+<p:notes xmlns:a="http://schemas.openxmlformats.org/drawingml/2006/main" xmlns:r="http://schemas.openxmlformats.org/officeDocument/2006/relationships" xmlns:p="http://schemas.openxmlformats.org/presentationml/2006/main">
+  <p:cSld>
+    <p:spTree>
+      <p:nvGrpSpPr>
+        <p:cNvPr id="1" name=""/>
+        <p:cNvGrpSpPr/>
+        <p:nvPr/>
+      </p:nvGrpSpPr>
+      <p:grpSpPr>
+        <a:xfrm>
+          <a:off x="0" y="0"/>
+          <a:ext cx="0" cy="0"/>
+          <a:chOff x="0" y="0"/>
+          <a:chExt cx="0" cy="0"/>
+        </a:xfrm>
+      </p:grpSpPr>
+      <p:sp>
+        <p:nvSpPr>
+          <p:cNvPr id="2" name="Slide Image Placeholder 1"/>
+          <p:cNvSpPr>
+            <a:spLocks noGrp="1" noRot="1" noChangeAspect="1"/>
+          </p:cNvSpPr>
+          <p:nvPr>
+            <p:ph type="sldImg"/>
+          </p:nvPr>
+        </p:nvSpPr>
+        <p:spPr/>
+      </p:sp>
+      <p:sp>
+        <p:nvSpPr>
+          <p:cNvPr id="3" name="Notes Placeholder 2"/>
+          <p:cNvSpPr>
+            <a:spLocks noGrp="1"/>
+          </p:cNvSpPr>
+          <p:nvPr>
+            <p:ph type="body" idx="1"/>
+          </p:nvPr>
+        </p:nvSpPr>
+        <p:spPr/>
+        <p:txBody>
+          <a:bodyPr/>
+          <a:lstStyle/>
+          <a:p>
+            <a:r>
+              <a:rPr lang="en-US" dirty="0"/>
+              <a:t>Once you have some understanding of the code region that you suspect contains the bug, writing a unit test that can confirm that suspicion is great for a few reasons:</a:t>
+            </a:r>
+          </a:p>
+          <a:p>
+            <a:pPr marL="228600" indent="-228600">
+              <a:buAutoNum type="arabicPeriod"/>
+            </a:pPr>
+            <a:r>
+              <a:rPr lang="en-US" dirty="0"/>
+              <a:t>Makes it super fast to reproduce!</a:t>
+            </a:r>
+          </a:p>
+          <a:p>
+            <a:pPr marL="228600" indent="-228600">
+              <a:buAutoNum type="arabicPeriod"/>
+            </a:pPr>
+            <a:r>
+              <a:rPr lang="en-US" dirty="0"/>
+              <a:t>Provides a reasonable oracle to tell you when you’ve fixed it (test passes)</a:t>
+            </a:r>
+          </a:p>
+          <a:p>
+            <a:pPr marL="228600" indent="-228600">
+              <a:buAutoNum type="arabicPeriod"/>
+            </a:pPr>
+            <a:r>
+              <a:rPr lang="en-US" dirty="0"/>
+              <a:t>The test serves as an artifact for future you (or other developer) working in this code, can help detect a regression</a:t>
+            </a:r>
+          </a:p>
+          <a:p>
+            <a:pPr marL="0" indent="0">
+              <a:buNone/>
+            </a:pPr>
+            <a:endParaRPr lang="en-US" dirty="0"/>
+          </a:p>
+          <a:p>
+            <a:pPr marL="0" indent="0">
+              <a:buNone/>
+            </a:pPr>
+            <a:r>
+              <a:rPr lang="en-US" dirty="0"/>
+              <a:t>You also might need to write a unit test if you are reporting a bug in someone else’s code (either in your org, or in an open source project) and expect them to fix it. Considering our discussion of how hard it can be to isolate and reproduce a bug, providing a developer with a unit test that demonstrates the bug and can be used to determine when it’s fixed is a tremendous help.</a:t>
+            </a:r>
+          </a:p>
+          <a:p>
+            <a:endParaRPr lang="en-US" dirty="0"/>
+          </a:p>
+        </p:txBody>
+      </p:sp>
+      <p:sp>
+        <p:nvSpPr>
+          <p:cNvPr id="4" name="Slide Number Placeholder 3"/>
+          <p:cNvSpPr>
+            <a:spLocks noGrp="1"/>
+          </p:cNvSpPr>
+          <p:nvPr>
+            <p:ph type="sldNum" sz="quarter" idx="5"/>
+          </p:nvPr>
+        </p:nvSpPr>
+        <p:spPr/>
+        <p:txBody>
+          <a:bodyPr/>
+          <a:lstStyle/>
+          <a:p>
+            <a:fld id="{07937F07-1250-4CCE-B198-1B2887014F41}" type="slidenum">
+              <a:rPr lang="en-US" smtClean="0"/>
+              <a:t>12</a:t>
+            </a:fld>
+            <a:endParaRPr lang="en-US"/>
+          </a:p>
+        </p:txBody>
+      </p:sp>
+    </p:spTree>
+    <p:extLst>
+      <p:ext uri="{BB962C8B-B14F-4D97-AF65-F5344CB8AC3E}">
+        <p14:creationId xmlns:p14="http://schemas.microsoft.com/office/powerpoint/2010/main" val="741919425"/>
+      </p:ext>
+    </p:extLst>
+  </p:cSld>
+  <p:clrMapOvr>
+    <a:masterClrMapping/>
+  </p:clrMapOvr>
+</p:notes>
+</file>
+
+<file path=ppt/notesSlides/notesSlide12.xml><?xml version="1.0" encoding="utf-8"?>
+<p:notes xmlns:a="http://schemas.openxmlformats.org/drawingml/2006/main" xmlns:r="http://schemas.openxmlformats.org/officeDocument/2006/relationships" xmlns:p="http://schemas.openxmlformats.org/presentationml/2006/main">
+  <p:cSld>
+    <p:spTree>
+      <p:nvGrpSpPr>
+        <p:cNvPr id="1" name=""/>
+        <p:cNvGrpSpPr/>
+        <p:nvPr/>
+      </p:nvGrpSpPr>
+      <p:grpSpPr>
+        <a:xfrm>
+          <a:off x="0" y="0"/>
+          <a:ext cx="0" cy="0"/>
+          <a:chOff x="0" y="0"/>
+          <a:chExt cx="0" cy="0"/>
+        </a:xfrm>
+      </p:grpSpPr>
+      <p:sp>
+        <p:nvSpPr>
+          <p:cNvPr id="2" name="Slide Image Placeholder 1"/>
+          <p:cNvSpPr>
+            <a:spLocks noGrp="1" noRot="1" noChangeAspect="1"/>
+          </p:cNvSpPr>
+          <p:nvPr>
+            <p:ph type="sldImg"/>
+          </p:nvPr>
+        </p:nvSpPr>
+        <p:spPr/>
+      </p:sp>
+      <p:sp>
+        <p:nvSpPr>
+          <p:cNvPr id="3" name="Notes Placeholder 2"/>
+          <p:cNvSpPr>
+            <a:spLocks noGrp="1"/>
+          </p:cNvSpPr>
+          <p:nvPr>
+            <p:ph type="body" idx="1"/>
+          </p:nvPr>
+        </p:nvSpPr>
+        <p:spPr/>
+        <p:txBody>
+          <a:bodyPr/>
+          <a:lstStyle/>
+          <a:p>
+            <a:r>
+              <a:rPr lang="en-US" dirty="0"/>
+              <a:t>An automated test like the example on the last slide can help us reproduce a bug and confirm if we’ve fixed it, but does not necessarily help us pinpoint the exact location and cause of the bug.</a:t>
+            </a:r>
+          </a:p>
+          <a:p>
+            <a:endParaRPr lang="en-US" dirty="0"/>
+          </a:p>
+          <a:p>
+            <a:r>
+              <a:rPr lang="en-US" dirty="0"/>
+              <a:t>Assertions can help us to localize a bug to a specific root cause, and also to understand what that root cause is. Many times, bugs occur because we make invalid assumptions about how some piece of code will behave. Assertions let us capture those assumptions about how the code should behave in runtime checks that will allow us to detect when one is violated. You can use assertions to document your understanding of the code as you debug it, and they can be useful documentation for future developers inspecting that code.</a:t>
+            </a:r>
+          </a:p>
+          <a:p>
+            <a:endParaRPr lang="en-US" dirty="0"/>
+          </a:p>
+          <a:p>
+            <a:r>
+              <a:rPr lang="en-US" dirty="0"/>
+              <a:t>Here are some examples of the kinds of assumptions that you might want to check with assertions (read examples slide)</a:t>
+            </a:r>
+          </a:p>
+        </p:txBody>
+      </p:sp>
+      <p:sp>
+        <p:nvSpPr>
+          <p:cNvPr id="4" name="Slide Number Placeholder 3"/>
+          <p:cNvSpPr>
+            <a:spLocks noGrp="1"/>
+          </p:cNvSpPr>
+          <p:nvPr>
+            <p:ph type="sldNum" sz="quarter" idx="5"/>
+          </p:nvPr>
+        </p:nvSpPr>
+        <p:spPr/>
+        <p:txBody>
+          <a:bodyPr/>
+          <a:lstStyle/>
+          <a:p>
+            <a:fld id="{07937F07-1250-4CCE-B198-1B2887014F41}" type="slidenum">
+              <a:rPr lang="en-US" smtClean="0"/>
+              <a:t>13</a:t>
+            </a:fld>
+            <a:endParaRPr lang="en-US"/>
+          </a:p>
+        </p:txBody>
+      </p:sp>
+    </p:spTree>
+    <p:extLst>
+      <p:ext uri="{BB962C8B-B14F-4D97-AF65-F5344CB8AC3E}">
+        <p14:creationId xmlns:p14="http://schemas.microsoft.com/office/powerpoint/2010/main" val="1604382590"/>
+      </p:ext>
+    </p:extLst>
+  </p:cSld>
+  <p:clrMapOvr>
+    <a:masterClrMapping/>
+  </p:clrMapOvr>
+</p:notes>
+</file>
+
+<file path=ppt/notesSlides/notesSlide13.xml><?xml version="1.0" encoding="utf-8"?>
+<p:notes xmlns:a="http://schemas.openxmlformats.org/drawingml/2006/main" xmlns:r="http://schemas.openxmlformats.org/officeDocument/2006/relationships" xmlns:p="http://schemas.openxmlformats.org/presentationml/2006/main">
+  <p:cSld>
+    <p:spTree>
+      <p:nvGrpSpPr>
+        <p:cNvPr id="1" name=""/>
+        <p:cNvGrpSpPr/>
+        <p:nvPr/>
+      </p:nvGrpSpPr>
+      <p:grpSpPr>
+        <a:xfrm>
+          <a:off x="0" y="0"/>
+          <a:ext cx="0" cy="0"/>
+          <a:chOff x="0" y="0"/>
+          <a:chExt cx="0" cy="0"/>
+        </a:xfrm>
+      </p:grpSpPr>
+      <p:sp>
+        <p:nvSpPr>
+          <p:cNvPr id="2" name="Slide Image Placeholder 1"/>
+          <p:cNvSpPr>
+            <a:spLocks noGrp="1" noRot="1" noChangeAspect="1"/>
+          </p:cNvSpPr>
+          <p:nvPr>
+            <p:ph type="sldImg"/>
+          </p:nvPr>
+        </p:nvSpPr>
+        <p:spPr/>
+      </p:sp>
+      <p:sp>
+        <p:nvSpPr>
+          <p:cNvPr id="3" name="Notes Placeholder 2"/>
+          <p:cNvSpPr>
+            <a:spLocks noGrp="1"/>
+          </p:cNvSpPr>
+          <p:nvPr>
+            <p:ph type="body" idx="1"/>
+          </p:nvPr>
+        </p:nvSpPr>
+        <p:spPr/>
+        <p:txBody>
+          <a:bodyPr/>
+          <a:lstStyle/>
+          <a:p>
+            <a:r>
+              <a:rPr lang="en-US" dirty="0"/>
+              <a:t>Some classes of bugs are so common and so difficult to debug that there are specialized debugging tools created just for those reasons.</a:t>
+            </a:r>
+          </a:p>
+          <a:p>
+            <a:endParaRPr lang="en-US" dirty="0"/>
+          </a:p>
+          <a:p>
+            <a:r>
+              <a:rPr lang="en-US" dirty="0"/>
+              <a:t>For example, if you’ve ever written a C or C++ program, it’s likely you’ve also written code with memory errors that results in a segmentation fault. These are hard to debug. But, when running your program with ‘</a:t>
+            </a:r>
+            <a:r>
+              <a:rPr lang="en-US" dirty="0" err="1"/>
+              <a:t>valgrind</a:t>
+            </a:r>
+            <a:r>
+              <a:rPr lang="en-US" dirty="0"/>
+              <a:t>’, you get a much more useful error when the program crashes: a description of the memory error that happened, and where in the code it happened.</a:t>
+            </a:r>
+          </a:p>
+          <a:p>
+            <a:endParaRPr lang="en-US" dirty="0"/>
+          </a:p>
+          <a:p>
+            <a:r>
+              <a:rPr lang="en-US" dirty="0"/>
+              <a:t>We’ll see another example of a domain-specific debugging tool when we get to React – the React developer tools are a very useful suite of debugging extensions that are particularly useful for debugging React rendering problems.</a:t>
+            </a:r>
+          </a:p>
+        </p:txBody>
+      </p:sp>
+      <p:sp>
+        <p:nvSpPr>
+          <p:cNvPr id="4" name="Slide Number Placeholder 3"/>
+          <p:cNvSpPr>
+            <a:spLocks noGrp="1"/>
+          </p:cNvSpPr>
+          <p:nvPr>
+            <p:ph type="sldNum" sz="quarter" idx="5"/>
+          </p:nvPr>
+        </p:nvSpPr>
+        <p:spPr/>
+        <p:txBody>
+          <a:bodyPr/>
+          <a:lstStyle/>
+          <a:p>
+            <a:fld id="{07937F07-1250-4CCE-B198-1B2887014F41}" type="slidenum">
+              <a:rPr lang="en-US" smtClean="0"/>
+              <a:t>14</a:t>
+            </a:fld>
+            <a:endParaRPr lang="en-US"/>
+          </a:p>
+        </p:txBody>
+      </p:sp>
+    </p:spTree>
+    <p:extLst>
+      <p:ext uri="{BB962C8B-B14F-4D97-AF65-F5344CB8AC3E}">
+        <p14:creationId xmlns:p14="http://schemas.microsoft.com/office/powerpoint/2010/main" val="3072094411"/>
+      </p:ext>
+    </p:extLst>
+  </p:cSld>
+  <p:clrMapOvr>
+    <a:masterClrMapping/>
+  </p:clrMapOvr>
+</p:notes>
+</file>
+
+<file path=ppt/notesSlides/notesSlide14.xml><?xml version="1.0" encoding="utf-8"?>
+<p:notes xmlns:a="http://schemas.openxmlformats.org/drawingml/2006/main" xmlns:r="http://schemas.openxmlformats.org/officeDocument/2006/relationships" xmlns:p="http://schemas.openxmlformats.org/presentationml/2006/main">
+  <p:cSld>
+    <p:spTree>
+      <p:nvGrpSpPr>
+        <p:cNvPr id="1" name=""/>
+        <p:cNvGrpSpPr/>
+        <p:nvPr/>
+      </p:nvGrpSpPr>
+      <p:grpSpPr>
+        <a:xfrm>
+          <a:off x="0" y="0"/>
+          <a:ext cx="0" cy="0"/>
+          <a:chOff x="0" y="0"/>
+          <a:chExt cx="0" cy="0"/>
+        </a:xfrm>
+      </p:grpSpPr>
+      <p:sp>
+        <p:nvSpPr>
+          <p:cNvPr id="2" name="Slide Image Placeholder 1"/>
+          <p:cNvSpPr>
+            <a:spLocks noGrp="1" noRot="1" noChangeAspect="1"/>
+          </p:cNvSpPr>
+          <p:nvPr>
+            <p:ph type="sldImg"/>
+          </p:nvPr>
+        </p:nvSpPr>
+        <p:spPr/>
+      </p:sp>
+      <p:sp>
+        <p:nvSpPr>
+          <p:cNvPr id="3" name="Notes Placeholder 2"/>
+          <p:cNvSpPr>
+            <a:spLocks noGrp="1"/>
+          </p:cNvSpPr>
+          <p:nvPr>
+            <p:ph type="body" idx="1"/>
+          </p:nvPr>
+        </p:nvSpPr>
+        <p:spPr/>
+        <p:txBody>
+          <a:bodyPr/>
+          <a:lstStyle/>
+          <a:p>
+            <a:endParaRPr lang="en-US" dirty="0"/>
+          </a:p>
+        </p:txBody>
+      </p:sp>
+      <p:sp>
+        <p:nvSpPr>
+          <p:cNvPr id="4" name="Slide Number Placeholder 3"/>
+          <p:cNvSpPr>
+            <a:spLocks noGrp="1"/>
+          </p:cNvSpPr>
+          <p:nvPr>
+            <p:ph type="sldNum" sz="quarter" idx="5"/>
+          </p:nvPr>
+        </p:nvSpPr>
+        <p:spPr/>
+        <p:txBody>
+          <a:bodyPr/>
+          <a:lstStyle/>
+          <a:p>
+            <a:fld id="{07937F07-1250-4CCE-B198-1B2887014F41}" type="slidenum">
+              <a:rPr lang="en-US" smtClean="0"/>
+              <a:t>16</a:t>
+            </a:fld>
+            <a:endParaRPr lang="en-US"/>
+          </a:p>
+        </p:txBody>
+      </p:sp>
+    </p:spTree>
+    <p:extLst>
+      <p:ext uri="{BB962C8B-B14F-4D97-AF65-F5344CB8AC3E}">
+        <p14:creationId xmlns:p14="http://schemas.microsoft.com/office/powerpoint/2010/main" val="617897637"/>
       </p:ext>
     </p:extLst>
   </p:cSld>
@@ -722,71 +1223,8 @@
             </a:pPr>
             <a:r>
               <a:rPr lang="en-US" dirty="0"/>
-              <a:t>Once we are able to reproduce the bug, the next step is to start debugging. </a:t>
-            </a:r>
-            <a:r>
-              <a:rPr lang="en-US" i="1" dirty="0"/>
-              <a:t>Most</a:t>
-            </a:r>
-            <a:r>
-              <a:rPr lang="en-US" dirty="0"/>
-              <a:t> bugs that you are likely to run-into are </a:t>
-            </a:r>
-            <a:r>
-              <a:rPr lang="en-US" i="1" dirty="0"/>
-              <a:t>deterministic</a:t>
-            </a:r>
-            <a:r>
-              <a:rPr lang="en-US" dirty="0"/>
-              <a:t>: the same bug results from the same input. This means that we can systematically poke at the code until we find the root cause or fix the bug</a:t>
-            </a:r>
-          </a:p>
-          <a:p>
-            <a:endParaRPr lang="en-US" dirty="0"/>
-          </a:p>
-          <a:p>
-            <a:r>
-              <a:rPr lang="en-US" dirty="0"/>
-              <a:t>&lt;read slide&gt;</a:t>
-            </a:r>
-          </a:p>
-          <a:p>
-            <a:endParaRPr lang="en-US" dirty="0"/>
-          </a:p>
-          <a:p>
-            <a:r>
-              <a:rPr lang="en-US" dirty="0"/>
-              <a:t>The key idea for the debugging log is that: if you can’t debug an issue in the first few minutes, it’s unlikely that you will be able to remember all of the things that you have tried, why you tried them, and what else you meant to try. Even worse, you might end up feeling “certain” that you had tried to see if X was the cause, when in reality, you hadn’t, and X was the cause. There is no formal notation to consider for this log, but it’s important to jot down these kinds of questions.</a:t>
-            </a:r>
-          </a:p>
-          <a:p>
-            <a:endParaRPr lang="en-US" dirty="0"/>
-          </a:p>
-          <a:p>
-            <a:pPr marL="0" marR="0" lvl="0" indent="0" algn="l" defTabSz="914400" rtl="0" eaLnBrk="1" fontAlgn="auto" latinLnBrk="0" hangingPunct="1">
-              <a:lnSpc>
-                <a:spcPct val="100000"/>
-              </a:lnSpc>
-              <a:spcBef>
-                <a:spcPts val="0"/>
-              </a:spcBef>
-              <a:spcAft>
-                <a:spcPts val="0"/>
-              </a:spcAft>
-              <a:buClrTx/>
-              <a:buSzTx/>
-              <a:buFontTx/>
-              <a:buNone/>
-              <a:tabLst/>
-              <a:defRPr/>
-            </a:pPr>
-            <a:r>
-              <a:rPr lang="en-US" sz="1200" dirty="0"/>
-              <a:t>The TAs will ask you this information if you ask for help debugging, so save a step and write it out while you try and solve your problem yourself!</a:t>
-            </a:r>
-          </a:p>
-          <a:p>
-            <a:endParaRPr lang="en-US" dirty="0"/>
+              <a:t>Suggested “warm up” discussion: Ask students to describe how they debug.</a:t>
+            </a:r>
           </a:p>
         </p:txBody>
       </p:sp>
@@ -807,7 +1245,7 @@
           <a:p>
             <a:fld id="{07937F07-1250-4CCE-B198-1B2887014F41}" type="slidenum">
               <a:rPr lang="en-US" smtClean="0"/>
-              <a:t>5</a:t>
+              <a:t>3</a:t>
             </a:fld>
             <a:endParaRPr lang="en-US"/>
           </a:p>
@@ -816,7 +1254,7 @@
     </p:spTree>
     <p:extLst>
       <p:ext uri="{BB962C8B-B14F-4D97-AF65-F5344CB8AC3E}">
-        <p14:creationId xmlns:p14="http://schemas.microsoft.com/office/powerpoint/2010/main" val="595333751"/>
+        <p14:creationId xmlns:p14="http://schemas.microsoft.com/office/powerpoint/2010/main" val="1084633575"/>
       </p:ext>
     </p:extLst>
   </p:cSld>
@@ -872,31 +1310,75 @@
           <a:p>
             <a:r>
               <a:rPr lang="en-US" dirty="0"/>
-              <a:t>The overall goal with hypothesis formulation is to come up with possible causes for why the bug exists. Then, as long as those hypotheses are testable, we can prove or disprove them. As you generate hypotheses, you might want to keep in mind whether it’s important to find out precisely what the root cause of the bug was, or if a high-level fix is sufficient. For example, perhaps you run into a problem with </a:t>
+              <a:t>Consider an example of debugging HW2: You are failing some test on </a:t>
             </a:r>
             <a:r>
               <a:rPr lang="en-US" dirty="0" err="1"/>
-              <a:t>ESLint</a:t>
+              <a:t>gradescope</a:t>
             </a:r>
             <a:r>
               <a:rPr lang="en-US" dirty="0"/>
-              <a:t>, which is solved by deleting the </a:t>
+              <a:t>. The test tells you what it is checking for. You have two options:</a:t>
+            </a:r>
+          </a:p>
+          <a:p>
+            <a:r>
+              <a:rPr lang="en-US" dirty="0"/>
+              <a:t>1. Keep making changes and upload to </a:t>
             </a:r>
             <a:r>
               <a:rPr lang="en-US" dirty="0" err="1"/>
-              <a:t>node_modules</a:t>
+              <a:t>gradescope</a:t>
             </a:r>
             <a:r>
               <a:rPr lang="en-US" dirty="0"/>
-              <a:t> folder and reinstalling. This is probably a satisfactory solution, but if you were the maintainers of </a:t>
+              <a:t>. It will require you to switch to terminal, run </a:t>
             </a:r>
             <a:r>
               <a:rPr lang="en-US" dirty="0" err="1"/>
-              <a:t>ESLint</a:t>
+              <a:t>npm</a:t>
             </a:r>
             <a:r>
               <a:rPr lang="en-US" dirty="0"/>
-              <a:t>, you might want to know more about why the bug happened</a:t>
+              <a:t> run zip, open </a:t>
+            </a:r>
+            <a:r>
+              <a:rPr lang="en-US" dirty="0" err="1"/>
+              <a:t>gradescope</a:t>
+            </a:r>
+            <a:r>
+              <a:rPr lang="en-US" dirty="0"/>
+              <a:t>, upload zip, wait for </a:t>
+            </a:r>
+            <a:r>
+              <a:rPr lang="en-US" dirty="0" err="1"/>
+              <a:t>autograder</a:t>
+            </a:r>
+            <a:r>
+              <a:rPr lang="en-US" dirty="0"/>
+              <a:t> to run, then get the results, scroll through page to find the test you were interested in. And you can’t see console output. (we hide that on purpose, to discourage debugging-by-</a:t>
+            </a:r>
+            <a:r>
+              <a:rPr lang="en-US" dirty="0" err="1"/>
+              <a:t>console.log</a:t>
+            </a:r>
+            <a:r>
+              <a:rPr lang="en-US" dirty="0"/>
+              <a:t> on </a:t>
+            </a:r>
+            <a:r>
+              <a:rPr lang="en-US" dirty="0" err="1"/>
+              <a:t>gradescope</a:t>
+            </a:r>
+            <a:r>
+              <a:rPr lang="en-US" dirty="0"/>
+              <a:t>!)</a:t>
+            </a:r>
+          </a:p>
+          <a:p>
+            <a:r>
+              <a:rPr lang="en-US" dirty="0"/>
+              <a:t>2. Write a simple test that you can run locally in VSC by hitting F12, or whatever keystroke you have set. The test doesn’t even need to have an assertion – that would be GREAT, but if it’s faster to just get something that shows some output that you can quickly look at, then huzzah!</a:t>
             </a:r>
           </a:p>
           <a:p>
@@ -905,16 +1387,7 @@
           <a:p>
             <a:r>
               <a:rPr lang="en-US" dirty="0"/>
-              <a:t>For example: if we want to test if a recent change to the code introduces this bug, we could try to reproduce the bug on an older version.</a:t>
-            </a:r>
-          </a:p>
-          <a:p>
-            <a:endParaRPr lang="en-US" dirty="0"/>
-          </a:p>
-          <a:p>
-            <a:r>
-              <a:rPr lang="en-US" dirty="0"/>
-              <a:t>Most hypotheses will be along the lines of “did I make an incorrect assumption about how a library or API works”. The devil is in enumerating all of the possible incorrect assumptions that you might have made, and testing them. The best way to attack these kinds of problems is to start with testing some high-level, general assumptions, and then refine them. We’ll look at some strategies for generating and testing hypotheses.</a:t>
+              <a:t>More broadly, making it more efficient to reproduce the problem might also involve adding log messages so that it’s easier to tell when the problem manifests</a:t>
             </a:r>
           </a:p>
         </p:txBody>
@@ -936,7 +1409,7 @@
           <a:p>
             <a:fld id="{07937F07-1250-4CCE-B198-1B2887014F41}" type="slidenum">
               <a:rPr lang="en-US" smtClean="0"/>
-              <a:t>6</a:t>
+              <a:t>4</a:t>
             </a:fld>
             <a:endParaRPr lang="en-US"/>
           </a:p>
@@ -945,7 +1418,7 @@
     </p:spTree>
     <p:extLst>
       <p:ext uri="{BB962C8B-B14F-4D97-AF65-F5344CB8AC3E}">
-        <p14:creationId xmlns:p14="http://schemas.microsoft.com/office/powerpoint/2010/main" val="1834343915"/>
+        <p14:creationId xmlns:p14="http://schemas.microsoft.com/office/powerpoint/2010/main" val="1143051979"/>
       </p:ext>
     </p:extLst>
   </p:cSld>
@@ -999,9 +1472,42 @@
           <a:bodyPr/>
           <a:lstStyle/>
           <a:p>
+            <a:pPr marL="0" marR="0" lvl="0" indent="0" algn="l" defTabSz="914400" rtl="0" eaLnBrk="1" fontAlgn="auto" latinLnBrk="0" hangingPunct="1">
+              <a:lnSpc>
+                <a:spcPct val="100000"/>
+              </a:lnSpc>
+              <a:spcBef>
+                <a:spcPts val="0"/>
+              </a:spcBef>
+              <a:spcAft>
+                <a:spcPts val="0"/>
+              </a:spcAft>
+              <a:buClrTx/>
+              <a:buSzTx/>
+              <a:buFontTx/>
+              <a:buNone/>
+              <a:tabLst/>
+              <a:defRPr/>
+            </a:pPr>
             <a:r>
               <a:rPr lang="en-US" dirty="0"/>
-              <a:t>Here are some generic, high level strategies that you can use for debugging, and also to help you form hypotheses as to why the bug exists. You are probably familiar with all of these, and likely have tried each of these at some point. We think that it’s a good idea to internalize this list of high-level debugging strategies, and if you reach a “head-scratcher” of a debugging challenge, make sure that you’ve tried each of these before looking for more drastic solutions.</a:t>
+              <a:t>Once we are able to reproduce the bug, the next step is to start debugging. </a:t>
+            </a:r>
+            <a:r>
+              <a:rPr lang="en-US" i="1" dirty="0"/>
+              <a:t>Most</a:t>
+            </a:r>
+            <a:r>
+              <a:rPr lang="en-US" dirty="0"/>
+              <a:t> bugs that you are likely to run-into are </a:t>
+            </a:r>
+            <a:r>
+              <a:rPr lang="en-US" i="1" dirty="0"/>
+              <a:t>deterministic</a:t>
+            </a:r>
+            <a:r>
+              <a:rPr lang="en-US" dirty="0"/>
+              <a:t>: the same bug results from the same input. This means that we can systematically poke at the code until we find the root cause or fix the bug</a:t>
             </a:r>
           </a:p>
           <a:p>
@@ -1010,44 +1516,42 @@
           <a:p>
             <a:r>
               <a:rPr lang="en-US" dirty="0"/>
-              <a:t>Notes:</a:t>
-            </a:r>
+              <a:t>&lt;read slide&gt;</a:t>
+            </a:r>
+          </a:p>
+          <a:p>
+            <a:endParaRPr lang="en-US" dirty="0"/>
           </a:p>
           <a:p>
             <a:r>
               <a:rPr lang="en-US" dirty="0"/>
-              <a:t>OK #1 is just “google it”, but don’t just copy/paste the error message. Try to generalize your problem: what is the behavior that you are seeing, what do you expect? Try to learn more about what the behavior might be, even if the first result isn’t a </a:t>
-            </a:r>
-            <a:r>
-              <a:rPr lang="en-US" dirty="0" err="1"/>
-              <a:t>stackoverflow</a:t>
-            </a:r>
-            <a:r>
-              <a:rPr lang="en-US" dirty="0"/>
-              <a:t> post that says “here is the fix”</a:t>
-            </a:r>
-          </a:p>
-          <a:p>
-            <a:r>
-              <a:rPr lang="en-US" dirty="0"/>
-              <a:t>#2 is to help us find the: “Oh, it says that this code will never handle null inputs. But, I am passing null.” – it’s annoying that these pre </a:t>
-            </a:r>
-            <a:r>
-              <a:rPr lang="en-US" dirty="0" err="1"/>
-              <a:t>condtions</a:t>
-            </a:r>
-            <a:r>
-              <a:rPr lang="en-US" dirty="0"/>
-              <a:t> are sometimes specified but not machine checked, but it’s a good place to look for an answer to your bug.</a:t>
+              <a:t>The key idea for the debugging log is that: if you can’t debug an issue in the first few minutes, it’s unlikely that you will be able to remember all of the things that you have tried, why you tried them, and what else you meant to try. Even worse, you might end up feeling “certain” that you had tried to see if X was the cause, when in reality, you hadn’t, and X was the cause. There is no formal notation to consider for this log, but it’s important to jot down these kinds of questions.</a:t>
             </a:r>
           </a:p>
           <a:p>
             <a:endParaRPr lang="en-US" dirty="0"/>
           </a:p>
           <a:p>
-            <a:r>
-              <a:rPr lang="en-US" dirty="0"/>
-              <a:t>#3 is about differential debugging. If you probe sufficiently deep between a failing execution and a passing execution, you might get some insights into why it is failing. If you use git, you could roll back to a version of the code that works (git even has a tool, git bisect to help search a wide range of changes for one where you find that the code behaves differently). Or, you might find that your code passes on some inputs, but fails on others – by finding the minimal difference between a passing and a failing input, you might find the cause of that failure. Or, maybe you find that your code fails on your computer, but not on your teammates?</a:t>
+            <a:pPr marL="0" marR="0" lvl="0" indent="0" algn="l" defTabSz="914400" rtl="0" eaLnBrk="1" fontAlgn="auto" latinLnBrk="0" hangingPunct="1">
+              <a:lnSpc>
+                <a:spcPct val="100000"/>
+              </a:lnSpc>
+              <a:spcBef>
+                <a:spcPts val="0"/>
+              </a:spcBef>
+              <a:spcAft>
+                <a:spcPts val="0"/>
+              </a:spcAft>
+              <a:buClrTx/>
+              <a:buSzTx/>
+              <a:buFontTx/>
+              <a:buNone/>
+              <a:tabLst/>
+              <a:defRPr/>
+            </a:pPr>
+            <a:r>
+              <a:rPr lang="en-US" sz="1200" dirty="0"/>
+              <a:t>The TAs will ask you this information if you ask for help debugging, so save a step and write it out while you try and solve your problem yourself!</a:t>
             </a:r>
           </a:p>
           <a:p>
@@ -1072,7 +1576,7 @@
           <a:p>
             <a:fld id="{07937F07-1250-4CCE-B198-1B2887014F41}" type="slidenum">
               <a:rPr lang="en-US" smtClean="0"/>
-              <a:t>7</a:t>
+              <a:t>5</a:t>
             </a:fld>
             <a:endParaRPr lang="en-US"/>
           </a:p>
@@ -1081,7 +1585,7 @@
     </p:spTree>
     <p:extLst>
       <p:ext uri="{BB962C8B-B14F-4D97-AF65-F5344CB8AC3E}">
-        <p14:creationId xmlns:p14="http://schemas.microsoft.com/office/powerpoint/2010/main" val="1385078518"/>
+        <p14:creationId xmlns:p14="http://schemas.microsoft.com/office/powerpoint/2010/main" val="595333751"/>
       </p:ext>
     </p:extLst>
   </p:cSld>
@@ -1137,7 +1641,31 @@
           <a:p>
             <a:r>
               <a:rPr lang="en-US" dirty="0"/>
-              <a:t>Our code is probably not the only code with errors. The compiler, language runtime, and all of the libraries that we use might, too. Consequently, updating libraries might help correct some obscure bug in a library we are using. </a:t>
+              <a:t>The overall goal with hypothesis formulation is to come up with possible causes for why the bug exists. Then, as long as those hypotheses are testable, we can prove or disprove them. As you generate hypotheses, you might want to keep in mind whether it’s important to find out precisely what the root cause of the bug was, or if a high-level fix is sufficient. For example, perhaps you run into a problem with </a:t>
+            </a:r>
+            <a:r>
+              <a:rPr lang="en-US" dirty="0" err="1"/>
+              <a:t>ESLint</a:t>
+            </a:r>
+            <a:r>
+              <a:rPr lang="en-US" dirty="0"/>
+              <a:t>, which is solved by deleting the </a:t>
+            </a:r>
+            <a:r>
+              <a:rPr lang="en-US" dirty="0" err="1"/>
+              <a:t>node_modules</a:t>
+            </a:r>
+            <a:r>
+              <a:rPr lang="en-US" dirty="0"/>
+              <a:t> folder and reinstalling. This is probably a satisfactory solution, but if you were the maintainers of </a:t>
+            </a:r>
+            <a:r>
+              <a:rPr lang="en-US" dirty="0" err="1"/>
+              <a:t>ESLint</a:t>
+            </a:r>
+            <a:r>
+              <a:rPr lang="en-US" dirty="0"/>
+              <a:t>, you might want to know more about why the bug happened</a:t>
             </a:r>
           </a:p>
           <a:p>
@@ -1146,7 +1674,16 @@
           <a:p>
             <a:r>
               <a:rPr lang="en-US" dirty="0"/>
-              <a:t>Have a sensible back-up plan to revert the upgrades in case it makes things worse!</a:t>
+              <a:t>For example: if we want to test if a recent change to the code introduces this bug, we could try to reproduce the bug on an older version.</a:t>
+            </a:r>
+          </a:p>
+          <a:p>
+            <a:endParaRPr lang="en-US" dirty="0"/>
+          </a:p>
+          <a:p>
+            <a:r>
+              <a:rPr lang="en-US" dirty="0"/>
+              <a:t>Most hypotheses will be along the lines of “did I make an incorrect assumption about how a library or API works”. The devil is in enumerating all of the possible incorrect assumptions that you might have made, and testing them. The best way to attack these kinds of problems is to start with testing some high-level, general assumptions, and then refine them. We’ll look at some strategies for generating and testing hypotheses.</a:t>
             </a:r>
           </a:p>
         </p:txBody>
@@ -1168,7 +1705,7 @@
           <a:p>
             <a:fld id="{07937F07-1250-4CCE-B198-1B2887014F41}" type="slidenum">
               <a:rPr lang="en-US" smtClean="0"/>
-              <a:t>8</a:t>
+              <a:t>6</a:t>
             </a:fld>
             <a:endParaRPr lang="en-US"/>
           </a:p>
@@ -1177,7 +1714,7 @@
     </p:spTree>
     <p:extLst>
       <p:ext uri="{BB962C8B-B14F-4D97-AF65-F5344CB8AC3E}">
-        <p14:creationId xmlns:p14="http://schemas.microsoft.com/office/powerpoint/2010/main" val="3213647796"/>
+        <p14:creationId xmlns:p14="http://schemas.microsoft.com/office/powerpoint/2010/main" val="1834343915"/>
       </p:ext>
     </p:extLst>
   </p:cSld>
@@ -1233,7 +1770,7 @@
           <a:p>
             <a:r>
               <a:rPr lang="en-US" dirty="0"/>
-              <a:t>This debugging strategy is called “rubber duck” debugging, and many developers will attribute it to help them fix most of their problems.</a:t>
+              <a:t>Here are some generic, high level strategies that you can use for debugging, and also to help you form hypotheses as to why the bug exists. You are probably familiar with all of these, and likely have tried each of these at some point. We think that it’s a good idea to internalize this list of high-level debugging strategies, and if you reach a “head-scratcher” of a debugging challenge, make sure that you’ve tried each of these before looking for more drastic solutions.</a:t>
             </a:r>
           </a:p>
           <a:p>
@@ -1242,7 +1779,35 @@
           <a:p>
             <a:r>
               <a:rPr lang="en-US" dirty="0"/>
-              <a:t>A bug occurs when we write code that we think does one thing, but it does something else. Hence, a debugging strategy is to simply examine each line of your code and narrate what you think it should be doing. You could be explaining to a colleague, or if you’re alone, you could be explaining to a rubber duck (hence the name). Typically half-way through the explanation you’ll exclaim “oh, wait, look how silly I am, :facepalm: that’s the problem right there!”</a:t>
+              <a:t>Notes:</a:t>
+            </a:r>
+          </a:p>
+          <a:p>
+            <a:r>
+              <a:rPr lang="en-US" dirty="0"/>
+              <a:t>OK #1 is just “google it”, but don’t just copy/paste the error message. Try to generalize your problem: what is the behavior that you are seeing, what do you expect? Try to learn more about what the behavior might be, even if the first result isn’t a </a:t>
+            </a:r>
+            <a:r>
+              <a:rPr lang="en-US" dirty="0" err="1"/>
+              <a:t>stackoverflow</a:t>
+            </a:r>
+            <a:r>
+              <a:rPr lang="en-US" dirty="0"/>
+              <a:t> post that says “here is the fix”</a:t>
+            </a:r>
+          </a:p>
+          <a:p>
+            <a:r>
+              <a:rPr lang="en-US" dirty="0"/>
+              <a:t>#2 is to help us find the: “Oh, it says that this code will never handle null inputs. But, I am passing null.” – it’s annoying that these pre </a:t>
+            </a:r>
+            <a:r>
+              <a:rPr lang="en-US" dirty="0" err="1"/>
+              <a:t>condtions</a:t>
+            </a:r>
+            <a:r>
+              <a:rPr lang="en-US" dirty="0"/>
+              <a:t> are sometimes specified but not machine checked, but it’s a good place to look for an answer to your bug.</a:t>
             </a:r>
           </a:p>
           <a:p>
@@ -1251,17 +1816,11 @@
           <a:p>
             <a:r>
               <a:rPr lang="en-US" dirty="0"/>
-              <a:t>By explaining your code (either to someone else, or pretending to), you engage different parts of your brain, and will start to think about the code from the perspective of what you are reading that it does, as opposed to what you think it should do.</a:t>
+              <a:t>#3 is about differential debugging. If you probe sufficiently deep between a failing execution and a passing execution, you might get some insights into why it is failing. If you use git, you could roll back to a version of the code that works (git even has a tool, git bisect to help search a wide range of changes for one where you find that the code behaves differently). Or, you might find that your code passes on some inputs, but fails on others – by finding the minimal difference between a passing and a failing input, you might find the cause of that failure. Or, maybe you find that your code fails on your computer, but not on your teammates?</a:t>
             </a:r>
           </a:p>
           <a:p>
             <a:endParaRPr lang="en-US" dirty="0"/>
-          </a:p>
-          <a:p>
-            <a:r>
-              <a:rPr lang="en-US" dirty="0"/>
-              <a:t>For particularly complex pieces of code, you might also find it useful to draw out complex data structures &lt;read slide&gt;</a:t>
-            </a:r>
           </a:p>
         </p:txBody>
       </p:sp>
@@ -1282,7 +1841,7 @@
           <a:p>
             <a:fld id="{07937F07-1250-4CCE-B198-1B2887014F41}" type="slidenum">
               <a:rPr lang="en-US" smtClean="0"/>
-              <a:t>9</a:t>
+              <a:t>7</a:t>
             </a:fld>
             <a:endParaRPr lang="en-US"/>
           </a:p>
@@ -1291,7 +1850,7 @@
     </p:spTree>
     <p:extLst>
       <p:ext uri="{BB962C8B-B14F-4D97-AF65-F5344CB8AC3E}">
-        <p14:creationId xmlns:p14="http://schemas.microsoft.com/office/powerpoint/2010/main" val="2463653840"/>
+        <p14:creationId xmlns:p14="http://schemas.microsoft.com/office/powerpoint/2010/main" val="1385078518"/>
       </p:ext>
     </p:extLst>
   </p:cSld>
@@ -1347,59 +1906,16 @@
           <a:p>
             <a:r>
               <a:rPr lang="en-US" dirty="0"/>
-              <a:t>Debuggers are specialized tools built just for the purpose of helping you debug. So, if you need to debug something, it’s probably a good idea to get familiar with using a debugging tool. This is a screenshot of VSC’s debugger, on the </a:t>
-            </a:r>
-            <a:r>
-              <a:rPr lang="en-US" dirty="0" err="1"/>
-              <a:t>Covey.Town</a:t>
-            </a:r>
+              <a:t>Our code is probably not the only code with errors. The compiler, language runtime, and all of the libraries that we use might, too. Consequently, updating libraries might help correct some obscure bug in a library we are using. </a:t>
+            </a:r>
+          </a:p>
+          <a:p>
+            <a:endParaRPr lang="en-US" dirty="0"/>
+          </a:p>
+          <a:p>
             <a:r>
               <a:rPr lang="en-US" dirty="0"/>
-              <a:t> project. </a:t>
-            </a:r>
-          </a:p>
-          <a:p>
-            <a:endParaRPr lang="en-US" dirty="0"/>
-          </a:p>
-          <a:p>
-            <a:pPr marL="0" marR="0" lvl="0" indent="0" algn="l" defTabSz="914400" rtl="0" eaLnBrk="1" fontAlgn="auto" latinLnBrk="0" hangingPunct="1">
-              <a:lnSpc>
-                <a:spcPct val="100000"/>
-              </a:lnSpc>
-              <a:spcBef>
-                <a:spcPts val="0"/>
-              </a:spcBef>
-              <a:spcAft>
-                <a:spcPts val="0"/>
-              </a:spcAft>
-              <a:buClrTx/>
-              <a:buSzTx/>
-              <a:buFontTx/>
-              <a:buNone/>
-              <a:tabLst/>
-              <a:defRPr/>
-            </a:pPr>
-            <a:r>
-              <a:rPr lang="en-US" dirty="0"/>
-              <a:t>A debugger will let you advance the execution statement-by-statement (including stepping “into” method calls). Of course, it is usually not feasible to step through EVERY statement – it would be a slow process.</a:t>
-            </a:r>
-          </a:p>
-          <a:p>
-            <a:endParaRPr lang="en-US" dirty="0"/>
-          </a:p>
-          <a:p>
-            <a:r>
-              <a:rPr lang="en-US" dirty="0"/>
-              <a:t>However, using a debugger interactively can help you narrow down to the code that interests you. Perhaps you hypothesize that there is a bug in some method. Set a breakpoint at the start, and set one at the end. Examine the values of variables and expressions at the start and end. If everything still looks OK at the end, then maybe you should look somewhere else. If you see that the error occurs in the method, then run the program under your debugger again, and step more carefully through the execution.</a:t>
-            </a:r>
-          </a:p>
-          <a:p>
-            <a:endParaRPr lang="en-US" dirty="0"/>
-          </a:p>
-          <a:p>
-            <a:r>
-              <a:rPr lang="en-US" dirty="0"/>
-              <a:t>You should get comfortable with the keyboard commands to quickly interact with the debugger – for the same reason why it’s important to be able to reproduce a failure quickly (because you will need to do that task a lot), it’s also important to be able to navigate through a debugger quickly, because you might have to do so quite a bit!</a:t>
+              <a:t>Have a sensible back-up plan to revert the upgrades in case it makes things worse!</a:t>
             </a:r>
           </a:p>
         </p:txBody>
@@ -1421,7 +1937,7 @@
           <a:p>
             <a:fld id="{07937F07-1250-4CCE-B198-1B2887014F41}" type="slidenum">
               <a:rPr lang="en-US" smtClean="0"/>
-              <a:t>10</a:t>
+              <a:t>8</a:t>
             </a:fld>
             <a:endParaRPr lang="en-US"/>
           </a:p>
@@ -1430,7 +1946,7 @@
     </p:spTree>
     <p:extLst>
       <p:ext uri="{BB962C8B-B14F-4D97-AF65-F5344CB8AC3E}">
-        <p14:creationId xmlns:p14="http://schemas.microsoft.com/office/powerpoint/2010/main" val="3306561777"/>
+        <p14:creationId xmlns:p14="http://schemas.microsoft.com/office/powerpoint/2010/main" val="3213647796"/>
       </p:ext>
     </p:extLst>
   </p:cSld>
@@ -1486,15 +2002,16 @@
           <a:p>
             <a:r>
               <a:rPr lang="en-US" dirty="0"/>
-              <a:t>This is the formal strategy for “Add </a:t>
-            </a:r>
-            <a:r>
-              <a:rPr lang="en-US" dirty="0" err="1"/>
-              <a:t>printlns</a:t>
-            </a:r>
+              <a:t>This debugging strategy is called “rubber duck” debugging, and many developers will attribute it to help them fix most of their problems.</a:t>
+            </a:r>
+          </a:p>
+          <a:p>
+            <a:endParaRPr lang="en-US" dirty="0"/>
+          </a:p>
+          <a:p>
             <a:r>
               <a:rPr lang="en-US" dirty="0"/>
-              <a:t>”</a:t>
+              <a:t>A bug occurs when we write code that we think does one thing, but it does something else. Hence, a debugging strategy is to simply examine each line of your code and narrate what you think it should be doing. You could be explaining to a colleague, or if you’re alone, you could be explaining to a rubber duck (hence the name). Typically half-way through the explanation you’ll exclaim “oh, wait, look how silly I am, :facepalm: that’s the problem right there!”</a:t>
             </a:r>
           </a:p>
           <a:p>
@@ -1503,7 +2020,7 @@
           <a:p>
             <a:r>
               <a:rPr lang="en-US" dirty="0"/>
-              <a:t>Some might say that “Logging statements are only used by those who don’t know how to use a debugger.” There are, however, a variety of cases where a log might be more useful than an interactive debugger, for example, if you have a bug that occurs non-deterministically (so called “heisenbugs”). If the bug only shows up on 1 out of 100 executions, it might be more productive to add a logging statement to help you understand WHY it only happens on those 1 out of 100, and then focus on reproducing and fixing that with a debugger.</a:t>
+              <a:t>By explaining your code (either to someone else, or pretending to), you engage different parts of your brain, and will start to think about the code from the perspective of what you are reading that it does, as opposed to what you think it should do.</a:t>
             </a:r>
           </a:p>
           <a:p>
@@ -1512,38 +2029,8 @@
           <a:p>
             <a:r>
               <a:rPr lang="en-US" dirty="0"/>
-              <a:t>For example, the log messages on the right are quite verbose, but Prof Bell found them to be useful when debugging an issue with code that connects GitHub Actions’ continuous integration framework with </a:t>
-            </a:r>
-            <a:r>
-              <a:rPr lang="en-US" dirty="0" err="1"/>
-              <a:t>Northeastern’s</a:t>
-            </a:r>
-            <a:r>
-              <a:rPr lang="en-US" dirty="0"/>
-              <a:t> </a:t>
-            </a:r>
-            <a:r>
-              <a:rPr lang="en-US" dirty="0" err="1"/>
-              <a:t>Slurm</a:t>
-            </a:r>
-            <a:r>
-              <a:rPr lang="en-US" dirty="0"/>
-              <a:t> high performance computing cluster. There are many small applications that need to function successfully for this to work, and adding logging messages to each microservice was easier than attaching a debugger to all of them.</a:t>
-            </a:r>
-          </a:p>
-          <a:p>
-            <a:endParaRPr lang="en-US" dirty="0"/>
-          </a:p>
-          <a:p>
-            <a:r>
-              <a:rPr lang="en-US" dirty="0"/>
-              <a:t>Well-written log messages (for instance, those that are found to be most useful when debugging, and are configurable to be disabled when not debugging) also serve to create a useful artifact for future you (or someone else) who needs to debug other issues related to what you are fixing now: the log messages will already be in place! This is a good argument for using a configurable </a:t>
-            </a:r>
-            <a:r>
-              <a:rPr lang="en-US"/>
-              <a:t>logging library.</a:t>
-            </a:r>
-            <a:endParaRPr lang="en-US" dirty="0"/>
+              <a:t>For particularly complex pieces of code, you might also find it useful to draw out complex data structures &lt;read slide&gt;</a:t>
+            </a:r>
           </a:p>
         </p:txBody>
       </p:sp>
@@ -1564,7 +2051,7 @@
           <a:p>
             <a:fld id="{07937F07-1250-4CCE-B198-1B2887014F41}" type="slidenum">
               <a:rPr lang="en-US" smtClean="0"/>
-              <a:t>11</a:t>
+              <a:t>9</a:t>
             </a:fld>
             <a:endParaRPr lang="en-US"/>
           </a:p>
@@ -1573,7 +2060,7 @@
     </p:spTree>
     <p:extLst>
       <p:ext uri="{BB962C8B-B14F-4D97-AF65-F5344CB8AC3E}">
-        <p14:creationId xmlns:p14="http://schemas.microsoft.com/office/powerpoint/2010/main" val="2403984190"/>
+        <p14:creationId xmlns:p14="http://schemas.microsoft.com/office/powerpoint/2010/main" val="2463653840"/>
       </p:ext>
     </p:extLst>
   </p:cSld>
@@ -1627,7 +2114,62 @@
           <a:bodyPr/>
           <a:lstStyle/>
           <a:p>
+            <a:r>
+              <a:rPr lang="en-US" dirty="0"/>
+              <a:t>Debuggers are specialized tools built just for the purpose of helping you debug. So, if you need to debug something, it’s probably a good idea to get familiar with using a debugging tool. This is a screenshot of VSC’s debugger, on the </a:t>
+            </a:r>
+            <a:r>
+              <a:rPr lang="en-US" dirty="0" err="1"/>
+              <a:t>Covey.Town</a:t>
+            </a:r>
+            <a:r>
+              <a:rPr lang="en-US" dirty="0"/>
+              <a:t> project. </a:t>
+            </a:r>
+          </a:p>
+          <a:p>
             <a:endParaRPr lang="en-US" dirty="0"/>
+          </a:p>
+          <a:p>
+            <a:pPr marL="0" marR="0" lvl="0" indent="0" algn="l" defTabSz="914400" rtl="0" eaLnBrk="1" fontAlgn="auto" latinLnBrk="0" hangingPunct="1">
+              <a:lnSpc>
+                <a:spcPct val="100000"/>
+              </a:lnSpc>
+              <a:spcBef>
+                <a:spcPts val="0"/>
+              </a:spcBef>
+              <a:spcAft>
+                <a:spcPts val="0"/>
+              </a:spcAft>
+              <a:buClrTx/>
+              <a:buSzTx/>
+              <a:buFontTx/>
+              <a:buNone/>
+              <a:tabLst/>
+              <a:defRPr/>
+            </a:pPr>
+            <a:r>
+              <a:rPr lang="en-US" dirty="0"/>
+              <a:t>A debugger will let you advance the execution statement-by-statement (including stepping “into” method calls). Of course, it is usually not feasible to step through EVERY statement – it would be a slow process.</a:t>
+            </a:r>
+          </a:p>
+          <a:p>
+            <a:endParaRPr lang="en-US" dirty="0"/>
+          </a:p>
+          <a:p>
+            <a:r>
+              <a:rPr lang="en-US" dirty="0"/>
+              <a:t>However, using a debugger interactively can help you narrow down to the code that interests you. Perhaps you hypothesize that there is a bug in some method. Set a breakpoint at the start, and set one at the end. Examine the values of variables and expressions at the start and end. If everything still looks OK at the end, then maybe you should look somewhere else. If you see that the error occurs in the method, then run the program under your debugger again, and step more carefully through the execution.</a:t>
+            </a:r>
+          </a:p>
+          <a:p>
+            <a:endParaRPr lang="en-US" dirty="0"/>
+          </a:p>
+          <a:p>
+            <a:r>
+              <a:rPr lang="en-US" dirty="0"/>
+              <a:t>You should get comfortable with the keyboard commands to quickly interact with the debugger – for the same reason why it’s important to be able to reproduce a failure quickly (because you will need to do that task a lot), it’s also important to be able to navigate through a debugger quickly, because you might have to do so quite a bit!</a:t>
+            </a:r>
           </a:p>
         </p:txBody>
       </p:sp>
@@ -1648,7 +2190,7 @@
           <a:p>
             <a:fld id="{07937F07-1250-4CCE-B198-1B2887014F41}" type="slidenum">
               <a:rPr lang="en-US" smtClean="0"/>
-              <a:t>12</a:t>
+              <a:t>10</a:t>
             </a:fld>
             <a:endParaRPr lang="en-US"/>
           </a:p>
@@ -1657,7 +2199,7 @@
     </p:spTree>
     <p:extLst>
       <p:ext uri="{BB962C8B-B14F-4D97-AF65-F5344CB8AC3E}">
-        <p14:creationId xmlns:p14="http://schemas.microsoft.com/office/powerpoint/2010/main" val="617897637"/>
+        <p14:creationId xmlns:p14="http://schemas.microsoft.com/office/powerpoint/2010/main" val="3306561777"/>
       </p:ext>
     </p:extLst>
   </p:cSld>
@@ -1821,7 +2363,7 @@
           <a:p>
             <a:fld id="{5D2A64DE-480B-420F-9649-4F8E696E08E0}" type="datetime1">
               <a:rPr lang="en-US" smtClean="0"/>
-              <a:t>2/2/22</a:t>
+              <a:t>2/4/22</a:t>
             </a:fld>
             <a:endParaRPr lang="en-US"/>
           </a:p>
@@ -2055,7 +2597,7 @@
           <a:p>
             <a:fld id="{0D3616D0-8311-4107-9726-6B805E7D05BA}" type="datetime1">
               <a:rPr lang="en-US" smtClean="0"/>
-              <a:t>2/2/22</a:t>
+              <a:t>2/4/22</a:t>
             </a:fld>
             <a:endParaRPr lang="en-US"/>
           </a:p>
@@ -2263,7 +2805,7 @@
           <a:p>
             <a:fld id="{3BC2557A-5C88-417A-A763-5AC779462A5F}" type="datetime1">
               <a:rPr lang="en-US" smtClean="0"/>
-              <a:t>2/2/22</a:t>
+              <a:t>2/4/22</a:t>
             </a:fld>
             <a:endParaRPr lang="en-US"/>
           </a:p>
@@ -3015,7 +3557,7 @@
           <a:p>
             <a:fld id="{07C7BFD4-467E-4EDE-93EA-052F5B39A4E5}" type="datetime1">
               <a:rPr lang="en-US" smtClean="0"/>
-              <a:t>2/2/22</a:t>
+              <a:t>2/4/22</a:t>
             </a:fld>
             <a:endParaRPr lang="en-US"/>
           </a:p>
@@ -3328,7 +3870,7 @@
           <a:p>
             <a:fld id="{A533CBE2-D5BE-47AC-ADC2-9CDFC1D0CF90}" type="datetime1">
               <a:rPr lang="en-US" smtClean="0"/>
-              <a:t>2/2/22</a:t>
+              <a:t>2/4/22</a:t>
             </a:fld>
             <a:endParaRPr lang="en-US"/>
           </a:p>
@@ -3629,7 +4171,7 @@
           <a:p>
             <a:fld id="{39B7EDB1-CE74-4951-85A2-0B01C2128E28}" type="datetime1">
               <a:rPr lang="en-US" smtClean="0"/>
-              <a:t>2/2/22</a:t>
+              <a:t>2/4/22</a:t>
             </a:fld>
             <a:endParaRPr lang="en-US"/>
           </a:p>
@@ -4077,7 +4619,7 @@
           <a:p>
             <a:fld id="{2BC7EB92-A5C2-4807-A9DC-9EDE6CBFB241}" type="datetime1">
               <a:rPr lang="en-US" smtClean="0"/>
-              <a:t>2/2/22</a:t>
+              <a:t>2/4/22</a:t>
             </a:fld>
             <a:endParaRPr lang="en-US"/>
           </a:p>
@@ -4223,7 +4765,7 @@
           <a:p>
             <a:fld id="{109E55A0-C911-4F03-82FC-7E5926047D46}" type="datetime1">
               <a:rPr lang="en-US" smtClean="0"/>
-              <a:t>2/2/22</a:t>
+              <a:t>2/4/22</a:t>
             </a:fld>
             <a:endParaRPr lang="en-US"/>
           </a:p>
@@ -4372,7 +4914,7 @@
           <a:p>
             <a:fld id="{2B7B7EE0-7771-4CD5-9B2B-3550753A54A1}" type="datetime1">
               <a:rPr lang="en-US" smtClean="0"/>
-              <a:t>2/2/22</a:t>
+              <a:t>2/4/22</a:t>
             </a:fld>
             <a:endParaRPr lang="en-US"/>
           </a:p>
@@ -4683,7 +5225,7 @@
           <a:p>
             <a:fld id="{F8B318B3-0E87-4416-A9B8-D891968C2727}" type="datetime1">
               <a:rPr lang="en-US" smtClean="0"/>
-              <a:t>2/2/22</a:t>
+              <a:t>2/4/22</a:t>
             </a:fld>
             <a:endParaRPr lang="en-US"/>
           </a:p>
@@ -4971,7 +5513,7 @@
           <a:p>
             <a:fld id="{EA476A42-A091-4468-A075-64A31BE59948}" type="datetime1">
               <a:rPr lang="en-US" smtClean="0"/>
-              <a:t>2/2/22</a:t>
+              <a:t>2/4/22</a:t>
             </a:fld>
             <a:endParaRPr lang="en-US"/>
           </a:p>
@@ -5212,7 +5754,7 @@
           <a:p>
             <a:fld id="{54D997E8-DDEE-43F1-8D9B-F8A1E11DE488}" type="datetime1">
               <a:rPr lang="en-US" smtClean="0"/>
-              <a:t>2/2/22</a:t>
+              <a:t>2/4/22</a:t>
             </a:fld>
             <a:endParaRPr lang="en-US"/>
           </a:p>
@@ -8262,6 +8804,2202 @@
           <p:cNvPr id="2" name="Title 1">
             <a:extLst>
               <a:ext uri="{FF2B5EF4-FFF2-40B4-BE49-F238E27FC236}">
+                <a16:creationId xmlns:a16="http://schemas.microsoft.com/office/drawing/2014/main" id="{BCFAB4A0-EF17-B541-9AF0-E258C05CE3F2}"/>
+              </a:ext>
+            </a:extLst>
+          </p:cNvPr>
+          <p:cNvSpPr>
+            <a:spLocks noGrp="1"/>
+          </p:cNvSpPr>
+          <p:nvPr>
+            <p:ph type="title"/>
+          </p:nvPr>
+        </p:nvSpPr>
+        <p:spPr/>
+        <p:txBody>
+          <a:bodyPr/>
+          <a:lstStyle/>
+          <a:p>
+            <a:r>
+              <a:rPr lang="en-US" dirty="0"/>
+              <a:t>Write Automated Tests</a:t>
+            </a:r>
+          </a:p>
+        </p:txBody>
+      </p:sp>
+      <p:sp>
+        <p:nvSpPr>
+          <p:cNvPr id="3" name="Content Placeholder 2">
+            <a:extLst>
+              <a:ext uri="{FF2B5EF4-FFF2-40B4-BE49-F238E27FC236}">
+                <a16:creationId xmlns:a16="http://schemas.microsoft.com/office/drawing/2014/main" id="{E226A4AD-99A6-6446-9E65-53D70BD699E8}"/>
+              </a:ext>
+            </a:extLst>
+          </p:cNvPr>
+          <p:cNvSpPr>
+            <a:spLocks noGrp="1"/>
+          </p:cNvSpPr>
+          <p:nvPr>
+            <p:ph idx="1"/>
+          </p:nvPr>
+        </p:nvSpPr>
+        <p:spPr/>
+        <p:txBody>
+          <a:bodyPr/>
+          <a:lstStyle/>
+          <a:p>
+            <a:r>
+              <a:rPr lang="en-US" dirty="0"/>
+              <a:t>Encode the minimal steps to reproduce the bug and the expected result in a test</a:t>
+            </a:r>
+          </a:p>
+          <a:p>
+            <a:r>
+              <a:rPr lang="en-US" dirty="0"/>
+              <a:t>Simplifies reproduction and evaluating fixes</a:t>
+            </a:r>
+          </a:p>
+          <a:p>
+            <a:r>
+              <a:rPr lang="en-US"/>
+              <a:t>Detects regressions</a:t>
+            </a:r>
+          </a:p>
+          <a:p>
+            <a:pPr marL="0" indent="0">
+              <a:buNone/>
+            </a:pPr>
+            <a:endParaRPr lang="en-US" dirty="0"/>
+          </a:p>
+        </p:txBody>
+      </p:sp>
+      <p:sp>
+        <p:nvSpPr>
+          <p:cNvPr id="4" name="Slide Number Placeholder 3">
+            <a:extLst>
+              <a:ext uri="{FF2B5EF4-FFF2-40B4-BE49-F238E27FC236}">
+                <a16:creationId xmlns:a16="http://schemas.microsoft.com/office/drawing/2014/main" id="{A6F9F232-849F-4343-B142-1B64648182FF}"/>
+              </a:ext>
+            </a:extLst>
+          </p:cNvPr>
+          <p:cNvSpPr>
+            <a:spLocks noGrp="1"/>
+          </p:cNvSpPr>
+          <p:nvPr>
+            <p:ph type="sldNum" sz="quarter" idx="12"/>
+          </p:nvPr>
+        </p:nvSpPr>
+        <p:spPr/>
+        <p:txBody>
+          <a:bodyPr/>
+          <a:lstStyle/>
+          <a:p>
+            <a:fld id="{20F37917-FD3A-4669-9018-DA04BCDD3D75}" type="slidenum">
+              <a:rPr lang="en-US" smtClean="0"/>
+              <a:t>12</a:t>
+            </a:fld>
+            <a:endParaRPr lang="en-US"/>
+          </a:p>
+        </p:txBody>
+      </p:sp>
+      <p:sp>
+        <p:nvSpPr>
+          <p:cNvPr id="6" name="TextBox 5">
+            <a:extLst>
+              <a:ext uri="{FF2B5EF4-FFF2-40B4-BE49-F238E27FC236}">
+                <a16:creationId xmlns:a16="http://schemas.microsoft.com/office/drawing/2014/main" id="{AE2ADF38-0719-F341-9905-0362337EAE05}"/>
+              </a:ext>
+            </a:extLst>
+          </p:cNvPr>
+          <p:cNvSpPr txBox="1"/>
+          <p:nvPr/>
+        </p:nvSpPr>
+        <p:spPr>
+          <a:xfrm>
+            <a:off x="1729409" y="3914369"/>
+            <a:ext cx="8733182" cy="1754326"/>
+          </a:xfrm>
+          <a:prstGeom prst="rect">
+            <a:avLst/>
+          </a:prstGeom>
+          <a:noFill/>
+          <a:ln w="12700" cap="flat" cmpd="sng" algn="ctr">
+            <a:solidFill>
+              <a:srgbClr val="0070C0"/>
+            </a:solidFill>
+            <a:prstDash val="solid"/>
+            <a:miter lim="800000"/>
+          </a:ln>
+          <a:effectLst/>
+        </p:spPr>
+        <p:style>
+          <a:lnRef idx="2">
+            <a:schemeClr val="accent1">
+              <a:shade val="50000"/>
+            </a:schemeClr>
+          </a:lnRef>
+          <a:fillRef idx="1">
+            <a:schemeClr val="accent1"/>
+          </a:fillRef>
+          <a:effectRef idx="0">
+            <a:schemeClr val="accent1"/>
+          </a:effectRef>
+          <a:fontRef idx="minor">
+            <a:schemeClr val="lt1"/>
+          </a:fontRef>
+        </p:style>
+        <p:txBody>
+          <a:bodyPr wrap="square">
+            <a:spAutoFit/>
+          </a:bodyPr>
+          <a:lstStyle/>
+          <a:p>
+            <a:r>
+              <a:rPr lang="en-US" dirty="0">
+                <a:solidFill>
+                  <a:srgbClr val="520067"/>
+                </a:solidFill>
+                <a:latin typeface="Courier New" panose="02070309020205020404" pitchFamily="49" charset="0"/>
+              </a:rPr>
+              <a:t>describe</a:t>
+            </a:r>
+            <a:r>
+              <a:rPr lang="en-US" dirty="0">
+                <a:solidFill>
+                  <a:srgbClr val="000000"/>
+                </a:solidFill>
+                <a:latin typeface="Courier New" panose="02070309020205020404" pitchFamily="49" charset="0"/>
+              </a:rPr>
+              <a:t>(</a:t>
+            </a:r>
+            <a:r>
+              <a:rPr lang="en-US" dirty="0">
+                <a:solidFill>
+                  <a:srgbClr val="0F7003"/>
+                </a:solidFill>
+                <a:latin typeface="Courier New" panose="02070309020205020404" pitchFamily="49" charset="0"/>
+              </a:rPr>
+              <a:t>'Create student'</a:t>
+            </a:r>
+            <a:r>
+              <a:rPr lang="en-US" dirty="0">
+                <a:solidFill>
+                  <a:srgbClr val="000000"/>
+                </a:solidFill>
+                <a:latin typeface="Courier New" panose="02070309020205020404" pitchFamily="49" charset="0"/>
+              </a:rPr>
+              <a:t>, () =&gt; {</a:t>
+            </a:r>
+            <a:endParaRPr lang="en-US" dirty="0">
+              <a:solidFill>
+                <a:srgbClr val="0F7003"/>
+              </a:solidFill>
+              <a:latin typeface="Courier New" panose="02070309020205020404" pitchFamily="49" charset="0"/>
+            </a:endParaRPr>
+          </a:p>
+          <a:p>
+            <a:r>
+              <a:rPr lang="en-US" dirty="0">
+                <a:solidFill>
+                  <a:srgbClr val="000000"/>
+                </a:solidFill>
+                <a:latin typeface="Courier New" panose="02070309020205020404" pitchFamily="49" charset="0"/>
+              </a:rPr>
+              <a:t>  </a:t>
+            </a:r>
+            <a:r>
+              <a:rPr lang="en-US" dirty="0">
+                <a:solidFill>
+                  <a:srgbClr val="520067"/>
+                </a:solidFill>
+                <a:latin typeface="Courier New" panose="02070309020205020404" pitchFamily="49" charset="0"/>
+              </a:rPr>
+              <a:t>it</a:t>
+            </a:r>
+            <a:r>
+              <a:rPr lang="en-US" dirty="0">
+                <a:solidFill>
+                  <a:srgbClr val="000000"/>
+                </a:solidFill>
+                <a:latin typeface="Courier New" panose="02070309020205020404" pitchFamily="49" charset="0"/>
+              </a:rPr>
+              <a:t>(</a:t>
+            </a:r>
+            <a:r>
+              <a:rPr lang="en-US" dirty="0">
+                <a:solidFill>
+                  <a:srgbClr val="0F7003"/>
+                </a:solidFill>
+                <a:latin typeface="Courier New" panose="02070309020205020404" pitchFamily="49" charset="0"/>
+              </a:rPr>
+              <a:t>'should return a valid ID'</a:t>
+            </a:r>
+            <a:r>
+              <a:rPr lang="en-US" dirty="0">
+                <a:solidFill>
+                  <a:srgbClr val="000000"/>
+                </a:solidFill>
+                <a:latin typeface="Courier New" panose="02070309020205020404" pitchFamily="49" charset="0"/>
+              </a:rPr>
+              <a:t>, </a:t>
+            </a:r>
+            <a:r>
+              <a:rPr lang="en-US" dirty="0">
+                <a:solidFill>
+                  <a:srgbClr val="00006D"/>
+                </a:solidFill>
+                <a:latin typeface="Courier New" panose="02070309020205020404" pitchFamily="49" charset="0"/>
+              </a:rPr>
+              <a:t>async </a:t>
+            </a:r>
+            <a:r>
+              <a:rPr lang="en-US" dirty="0">
+                <a:solidFill>
+                  <a:srgbClr val="000000"/>
+                </a:solidFill>
+                <a:latin typeface="Courier New" panose="02070309020205020404" pitchFamily="49" charset="0"/>
+              </a:rPr>
+              <a:t>() =&gt; {</a:t>
+            </a:r>
+            <a:endParaRPr lang="en-US" dirty="0">
+              <a:solidFill>
+                <a:srgbClr val="0F7003"/>
+              </a:solidFill>
+              <a:latin typeface="Courier New" panose="02070309020205020404" pitchFamily="49" charset="0"/>
+            </a:endParaRPr>
+          </a:p>
+          <a:p>
+            <a:r>
+              <a:rPr lang="en-US" dirty="0">
+                <a:solidFill>
+                  <a:srgbClr val="000000"/>
+                </a:solidFill>
+                <a:latin typeface="Courier New" panose="02070309020205020404" pitchFamily="49" charset="0"/>
+              </a:rPr>
+              <a:t>    </a:t>
+            </a:r>
+            <a:r>
+              <a:rPr lang="en-US" dirty="0">
+                <a:solidFill>
+                  <a:srgbClr val="00006D"/>
+                </a:solidFill>
+                <a:latin typeface="Courier New" panose="02070309020205020404" pitchFamily="49" charset="0"/>
+              </a:rPr>
+              <a:t>const </a:t>
+            </a:r>
+            <a:r>
+              <a:rPr lang="en-US" dirty="0" err="1">
+                <a:solidFill>
+                  <a:srgbClr val="377170"/>
+                </a:solidFill>
+                <a:latin typeface="Courier New" panose="02070309020205020404" pitchFamily="49" charset="0"/>
+              </a:rPr>
+              <a:t>createdStudent</a:t>
+            </a:r>
+            <a:r>
+              <a:rPr lang="en-US" dirty="0">
+                <a:solidFill>
+                  <a:srgbClr val="377170"/>
+                </a:solidFill>
+                <a:latin typeface="Courier New" panose="02070309020205020404" pitchFamily="49" charset="0"/>
+              </a:rPr>
+              <a:t> </a:t>
+            </a:r>
+            <a:r>
+              <a:rPr lang="en-US" dirty="0">
+                <a:solidFill>
+                  <a:srgbClr val="000000"/>
+                </a:solidFill>
+                <a:latin typeface="Courier New" panose="02070309020205020404" pitchFamily="49" charset="0"/>
+              </a:rPr>
+              <a:t>= </a:t>
+            </a:r>
+            <a:r>
+              <a:rPr lang="en-US" dirty="0">
+                <a:solidFill>
+                  <a:srgbClr val="00006D"/>
+                </a:solidFill>
+                <a:latin typeface="Courier New" panose="02070309020205020404" pitchFamily="49" charset="0"/>
+              </a:rPr>
+              <a:t>await </a:t>
+            </a:r>
+            <a:r>
+              <a:rPr lang="en-US" dirty="0" err="1">
+                <a:solidFill>
+                  <a:srgbClr val="000000"/>
+                </a:solidFill>
+                <a:latin typeface="Courier New" panose="02070309020205020404" pitchFamily="49" charset="0"/>
+              </a:rPr>
+              <a:t>client.addStudent</a:t>
+            </a:r>
+            <a:r>
+              <a:rPr lang="en-US" dirty="0">
+                <a:solidFill>
+                  <a:srgbClr val="000000"/>
+                </a:solidFill>
+                <a:latin typeface="Courier New" panose="02070309020205020404" pitchFamily="49" charset="0"/>
+              </a:rPr>
+              <a:t>(</a:t>
+            </a:r>
+            <a:r>
+              <a:rPr lang="en-US" dirty="0">
+                <a:solidFill>
+                  <a:srgbClr val="0F7003"/>
+                </a:solidFill>
+                <a:latin typeface="Courier New" panose="02070309020205020404" pitchFamily="49" charset="0"/>
+              </a:rPr>
+              <a:t>'Avery'</a:t>
+            </a:r>
+            <a:r>
+              <a:rPr lang="en-US" dirty="0">
+                <a:solidFill>
+                  <a:srgbClr val="000000"/>
+                </a:solidFill>
+                <a:latin typeface="Courier New" panose="02070309020205020404" pitchFamily="49" charset="0"/>
+              </a:rPr>
+              <a:t>);</a:t>
+            </a:r>
+          </a:p>
+          <a:p>
+            <a:r>
+              <a:rPr lang="en-US" dirty="0">
+                <a:solidFill>
+                  <a:srgbClr val="000000"/>
+                </a:solidFill>
+                <a:latin typeface="Courier New" panose="02070309020205020404" pitchFamily="49" charset="0"/>
+              </a:rPr>
+              <a:t>    </a:t>
+            </a:r>
+            <a:r>
+              <a:rPr lang="en-US" dirty="0">
+                <a:solidFill>
+                  <a:srgbClr val="520067"/>
+                </a:solidFill>
+                <a:latin typeface="Courier New" panose="02070309020205020404" pitchFamily="49" charset="0"/>
+              </a:rPr>
+              <a:t>expect</a:t>
+            </a:r>
+            <a:r>
+              <a:rPr lang="en-US" dirty="0">
+                <a:solidFill>
+                  <a:srgbClr val="000000"/>
+                </a:solidFill>
+                <a:latin typeface="Courier New" panose="02070309020205020404" pitchFamily="49" charset="0"/>
+              </a:rPr>
+              <a:t>(</a:t>
+            </a:r>
+            <a:r>
+              <a:rPr lang="en-US" dirty="0" err="1">
+                <a:solidFill>
+                  <a:srgbClr val="377170"/>
+                </a:solidFill>
+                <a:latin typeface="Courier New" panose="02070309020205020404" pitchFamily="49" charset="0"/>
+              </a:rPr>
+              <a:t>createdStudent</a:t>
+            </a:r>
+            <a:r>
+              <a:rPr lang="en-US" dirty="0" err="1">
+                <a:solidFill>
+                  <a:srgbClr val="000000"/>
+                </a:solidFill>
+                <a:latin typeface="Courier New" panose="02070309020205020404" pitchFamily="49" charset="0"/>
+              </a:rPr>
+              <a:t>.</a:t>
+            </a:r>
+            <a:r>
+              <a:rPr lang="en-US" dirty="0" err="1">
+                <a:solidFill>
+                  <a:srgbClr val="520067"/>
+                </a:solidFill>
+                <a:latin typeface="Courier New" panose="02070309020205020404" pitchFamily="49" charset="0"/>
+              </a:rPr>
+              <a:t>studentID</a:t>
+            </a:r>
+            <a:r>
+              <a:rPr lang="en-US" dirty="0">
+                <a:solidFill>
+                  <a:srgbClr val="000000"/>
+                </a:solidFill>
+                <a:latin typeface="Courier New" panose="02070309020205020404" pitchFamily="49" charset="0"/>
+              </a:rPr>
+              <a:t>).</a:t>
+            </a:r>
+            <a:r>
+              <a:rPr lang="en-US" dirty="0" err="1">
+                <a:solidFill>
+                  <a:srgbClr val="676834"/>
+                </a:solidFill>
+                <a:latin typeface="Courier New" panose="02070309020205020404" pitchFamily="49" charset="0"/>
+              </a:rPr>
+              <a:t>toBeGreaterThan</a:t>
+            </a:r>
+            <a:r>
+              <a:rPr lang="en-US" dirty="0">
+                <a:solidFill>
+                  <a:srgbClr val="000000"/>
+                </a:solidFill>
+                <a:latin typeface="Courier New" panose="02070309020205020404" pitchFamily="49" charset="0"/>
+              </a:rPr>
+              <a:t>(</a:t>
+            </a:r>
+            <a:r>
+              <a:rPr lang="en-US" dirty="0">
+                <a:solidFill>
+                  <a:srgbClr val="0000FE"/>
+                </a:solidFill>
+                <a:latin typeface="Courier New" panose="02070309020205020404" pitchFamily="49" charset="0"/>
+              </a:rPr>
+              <a:t>0</a:t>
+            </a:r>
+            <a:r>
+              <a:rPr lang="en-US" dirty="0">
+                <a:solidFill>
+                  <a:srgbClr val="000000"/>
+                </a:solidFill>
+                <a:latin typeface="Courier New" panose="02070309020205020404" pitchFamily="49" charset="0"/>
+              </a:rPr>
+              <a:t>);</a:t>
+            </a:r>
+            <a:endParaRPr lang="en-US" dirty="0">
+              <a:solidFill>
+                <a:srgbClr val="520067"/>
+              </a:solidFill>
+              <a:latin typeface="Courier New" panose="02070309020205020404" pitchFamily="49" charset="0"/>
+            </a:endParaRPr>
+          </a:p>
+          <a:p>
+            <a:r>
+              <a:rPr lang="en-US" dirty="0">
+                <a:solidFill>
+                  <a:srgbClr val="000000"/>
+                </a:solidFill>
+                <a:latin typeface="Courier New" panose="02070309020205020404" pitchFamily="49" charset="0"/>
+              </a:rPr>
+              <a:t>  });</a:t>
+            </a:r>
+          </a:p>
+          <a:p>
+            <a:r>
+              <a:rPr lang="en-US" dirty="0">
+                <a:solidFill>
+                  <a:srgbClr val="000000"/>
+                </a:solidFill>
+                <a:latin typeface="Courier New" panose="02070309020205020404" pitchFamily="49" charset="0"/>
+              </a:rPr>
+              <a:t>})</a:t>
+            </a:r>
+          </a:p>
+        </p:txBody>
+      </p:sp>
+      <p:sp>
+        <p:nvSpPr>
+          <p:cNvPr id="7" name="TextBox 6">
+            <a:extLst>
+              <a:ext uri="{FF2B5EF4-FFF2-40B4-BE49-F238E27FC236}">
+                <a16:creationId xmlns:a16="http://schemas.microsoft.com/office/drawing/2014/main" id="{33B62CCF-FB25-374C-9EC1-23A49D42F64F}"/>
+              </a:ext>
+            </a:extLst>
+          </p:cNvPr>
+          <p:cNvSpPr txBox="1"/>
+          <p:nvPr/>
+        </p:nvSpPr>
+        <p:spPr>
+          <a:xfrm>
+            <a:off x="1863977" y="5686010"/>
+            <a:ext cx="8204362" cy="369332"/>
+          </a:xfrm>
+          <a:prstGeom prst="rect">
+            <a:avLst/>
+          </a:prstGeom>
+          <a:noFill/>
+          <a:ln>
+            <a:noFill/>
+          </a:ln>
+        </p:spPr>
+        <p:style>
+          <a:lnRef idx="2">
+            <a:schemeClr val="accent1">
+              <a:shade val="50000"/>
+            </a:schemeClr>
+          </a:lnRef>
+          <a:fillRef idx="1">
+            <a:schemeClr val="accent1"/>
+          </a:fillRef>
+          <a:effectRef idx="0">
+            <a:schemeClr val="accent1"/>
+          </a:effectRef>
+          <a:fontRef idx="minor">
+            <a:schemeClr val="lt1"/>
+          </a:fontRef>
+        </p:style>
+        <p:txBody>
+          <a:bodyPr rot="0" spcFirstLastPara="0" vertOverflow="overflow" horzOverflow="overflow" vert="horz" wrap="none" lIns="91440" tIns="45720" rIns="91440" bIns="45720" numCol="1" spcCol="0" rtlCol="0" fromWordArt="0" anchor="ctr" anchorCtr="0" forceAA="0" compatLnSpc="1">
+            <a:prstTxWarp prst="textNoShape">
+              <a:avLst/>
+            </a:prstTxWarp>
+            <a:spAutoFit/>
+          </a:bodyPr>
+          <a:lstStyle/>
+          <a:p>
+            <a:pPr algn="l"/>
+            <a:r>
+              <a:rPr lang="en-US" dirty="0">
+                <a:solidFill>
+                  <a:schemeClr val="tx1"/>
+                </a:solidFill>
+              </a:rPr>
+              <a:t>Example test that might be useful if this input revealed a bug in student ID generation</a:t>
+            </a:r>
+          </a:p>
+        </p:txBody>
+      </p:sp>
+    </p:spTree>
+    <p:extLst>
+      <p:ext uri="{BB962C8B-B14F-4D97-AF65-F5344CB8AC3E}">
+        <p14:creationId xmlns:p14="http://schemas.microsoft.com/office/powerpoint/2010/main" val="3515017455"/>
+      </p:ext>
+    </p:extLst>
+  </p:cSld>
+  <p:clrMapOvr>
+    <a:masterClrMapping/>
+  </p:clrMapOvr>
+</p:sld>
+</file>
+
+<file path=ppt/slides/slide13.xml><?xml version="1.0" encoding="utf-8"?>
+<p:sld xmlns:a="http://schemas.openxmlformats.org/drawingml/2006/main" xmlns:r="http://schemas.openxmlformats.org/officeDocument/2006/relationships" xmlns:p="http://schemas.openxmlformats.org/presentationml/2006/main">
+  <p:cSld>
+    <p:spTree>
+      <p:nvGrpSpPr>
+        <p:cNvPr id="1" name=""/>
+        <p:cNvGrpSpPr/>
+        <p:nvPr/>
+      </p:nvGrpSpPr>
+      <p:grpSpPr>
+        <a:xfrm>
+          <a:off x="0" y="0"/>
+          <a:ext cx="0" cy="0"/>
+          <a:chOff x="0" y="0"/>
+          <a:chExt cx="0" cy="0"/>
+        </a:xfrm>
+      </p:grpSpPr>
+      <p:sp>
+        <p:nvSpPr>
+          <p:cNvPr id="2" name="Title 1">
+            <a:extLst>
+              <a:ext uri="{FF2B5EF4-FFF2-40B4-BE49-F238E27FC236}">
+                <a16:creationId xmlns:a16="http://schemas.microsoft.com/office/drawing/2014/main" id="{BCFAB4A0-EF17-B541-9AF0-E258C05CE3F2}"/>
+              </a:ext>
+            </a:extLst>
+          </p:cNvPr>
+          <p:cNvSpPr>
+            <a:spLocks noGrp="1"/>
+          </p:cNvSpPr>
+          <p:nvPr>
+            <p:ph type="title"/>
+          </p:nvPr>
+        </p:nvSpPr>
+        <p:spPr/>
+        <p:txBody>
+          <a:bodyPr/>
+          <a:lstStyle/>
+          <a:p>
+            <a:r>
+              <a:rPr lang="en-US" dirty="0"/>
+              <a:t>Add Assertions</a:t>
+            </a:r>
+          </a:p>
+        </p:txBody>
+      </p:sp>
+      <p:sp>
+        <p:nvSpPr>
+          <p:cNvPr id="3" name="Content Placeholder 2">
+            <a:extLst>
+              <a:ext uri="{FF2B5EF4-FFF2-40B4-BE49-F238E27FC236}">
+                <a16:creationId xmlns:a16="http://schemas.microsoft.com/office/drawing/2014/main" id="{E226A4AD-99A6-6446-9E65-53D70BD699E8}"/>
+              </a:ext>
+            </a:extLst>
+          </p:cNvPr>
+          <p:cNvSpPr>
+            <a:spLocks noGrp="1"/>
+          </p:cNvSpPr>
+          <p:nvPr>
+            <p:ph idx="1"/>
+          </p:nvPr>
+        </p:nvSpPr>
+        <p:spPr/>
+        <p:txBody>
+          <a:bodyPr>
+            <a:normAutofit lnSpcReduction="10000"/>
+          </a:bodyPr>
+          <a:lstStyle/>
+          <a:p>
+            <a:r>
+              <a:rPr lang="en-US" dirty="0"/>
+              <a:t>Capture what you think the state of your program should be in assertions</a:t>
+            </a:r>
+          </a:p>
+          <a:p>
+            <a:r>
+              <a:rPr lang="en-US" dirty="0"/>
+              <a:t>Assertions are a form of documentation</a:t>
+            </a:r>
+          </a:p>
+          <a:p>
+            <a:r>
+              <a:rPr lang="en-US" dirty="0"/>
+              <a:t>Common assumptions to check:</a:t>
+            </a:r>
+          </a:p>
+          <a:p>
+            <a:pPr lvl="1"/>
+            <a:r>
+              <a:rPr lang="en-US" dirty="0"/>
+              <a:t>Pre-conditions and post-conditions of functions</a:t>
+            </a:r>
+          </a:p>
+          <a:p>
+            <a:pPr lvl="1"/>
+            <a:r>
+              <a:rPr lang="en-US" dirty="0"/>
+              <a:t>After calls to APIs that are expected not to fail</a:t>
+            </a:r>
+          </a:p>
+          <a:p>
+            <a:pPr lvl="1"/>
+            <a:r>
+              <a:rPr lang="en-US" dirty="0"/>
+              <a:t>After loading remote resources</a:t>
+            </a:r>
+          </a:p>
+          <a:p>
+            <a:pPr lvl="1"/>
+            <a:r>
+              <a:rPr lang="en-US" dirty="0"/>
+              <a:t>After evaluating complex expressions to make sure that the result has some expected property or is otherwise reasonable</a:t>
+            </a:r>
+          </a:p>
+          <a:p>
+            <a:pPr lvl="1"/>
+            <a:r>
+              <a:rPr lang="en-US" dirty="0"/>
+              <a:t>In the “default” case of a switch statement</a:t>
+            </a:r>
+          </a:p>
+        </p:txBody>
+      </p:sp>
+      <p:sp>
+        <p:nvSpPr>
+          <p:cNvPr id="4" name="Slide Number Placeholder 3">
+            <a:extLst>
+              <a:ext uri="{FF2B5EF4-FFF2-40B4-BE49-F238E27FC236}">
+                <a16:creationId xmlns:a16="http://schemas.microsoft.com/office/drawing/2014/main" id="{A6F9F232-849F-4343-B142-1B64648182FF}"/>
+              </a:ext>
+            </a:extLst>
+          </p:cNvPr>
+          <p:cNvSpPr>
+            <a:spLocks noGrp="1"/>
+          </p:cNvSpPr>
+          <p:nvPr>
+            <p:ph type="sldNum" sz="quarter" idx="12"/>
+          </p:nvPr>
+        </p:nvSpPr>
+        <p:spPr/>
+        <p:txBody>
+          <a:bodyPr/>
+          <a:lstStyle/>
+          <a:p>
+            <a:fld id="{20F37917-FD3A-4669-9018-DA04BCDD3D75}" type="slidenum">
+              <a:rPr lang="en-US" smtClean="0"/>
+              <a:t>13</a:t>
+            </a:fld>
+            <a:endParaRPr lang="en-US"/>
+          </a:p>
+        </p:txBody>
+      </p:sp>
+    </p:spTree>
+    <p:extLst>
+      <p:ext uri="{BB962C8B-B14F-4D97-AF65-F5344CB8AC3E}">
+        <p14:creationId xmlns:p14="http://schemas.microsoft.com/office/powerpoint/2010/main" val="4200718703"/>
+      </p:ext>
+    </p:extLst>
+  </p:cSld>
+  <p:clrMapOvr>
+    <a:masterClrMapping/>
+  </p:clrMapOvr>
+</p:sld>
+</file>
+
+<file path=ppt/slides/slide14.xml><?xml version="1.0" encoding="utf-8"?>
+<p:sld xmlns:a="http://schemas.openxmlformats.org/drawingml/2006/main" xmlns:r="http://schemas.openxmlformats.org/officeDocument/2006/relationships" xmlns:p="http://schemas.openxmlformats.org/presentationml/2006/main">
+  <p:cSld>
+    <p:spTree>
+      <p:nvGrpSpPr>
+        <p:cNvPr id="1" name=""/>
+        <p:cNvGrpSpPr/>
+        <p:nvPr/>
+      </p:nvGrpSpPr>
+      <p:grpSpPr>
+        <a:xfrm>
+          <a:off x="0" y="0"/>
+          <a:ext cx="0" cy="0"/>
+          <a:chOff x="0" y="0"/>
+          <a:chExt cx="0" cy="0"/>
+        </a:xfrm>
+      </p:grpSpPr>
+      <p:sp>
+        <p:nvSpPr>
+          <p:cNvPr id="2" name="Title 1">
+            <a:extLst>
+              <a:ext uri="{FF2B5EF4-FFF2-40B4-BE49-F238E27FC236}">
+                <a16:creationId xmlns:a16="http://schemas.microsoft.com/office/drawing/2014/main" id="{BCFAB4A0-EF17-B541-9AF0-E258C05CE3F2}"/>
+              </a:ext>
+            </a:extLst>
+          </p:cNvPr>
+          <p:cNvSpPr>
+            <a:spLocks noGrp="1"/>
+          </p:cNvSpPr>
+          <p:nvPr>
+            <p:ph type="title"/>
+          </p:nvPr>
+        </p:nvSpPr>
+        <p:spPr/>
+        <p:txBody>
+          <a:bodyPr/>
+          <a:lstStyle/>
+          <a:p>
+            <a:r>
+              <a:rPr lang="en-US" dirty="0"/>
+              <a:t>Use a specialized debugging tool</a:t>
+            </a:r>
+          </a:p>
+        </p:txBody>
+      </p:sp>
+      <p:sp>
+        <p:nvSpPr>
+          <p:cNvPr id="4" name="Slide Number Placeholder 3">
+            <a:extLst>
+              <a:ext uri="{FF2B5EF4-FFF2-40B4-BE49-F238E27FC236}">
+                <a16:creationId xmlns:a16="http://schemas.microsoft.com/office/drawing/2014/main" id="{A6F9F232-849F-4343-B142-1B64648182FF}"/>
+              </a:ext>
+            </a:extLst>
+          </p:cNvPr>
+          <p:cNvSpPr>
+            <a:spLocks noGrp="1"/>
+          </p:cNvSpPr>
+          <p:nvPr>
+            <p:ph type="sldNum" sz="quarter" idx="12"/>
+          </p:nvPr>
+        </p:nvSpPr>
+        <p:spPr/>
+        <p:txBody>
+          <a:bodyPr/>
+          <a:lstStyle/>
+          <a:p>
+            <a:fld id="{20F37917-FD3A-4669-9018-DA04BCDD3D75}" type="slidenum">
+              <a:rPr lang="en-US" smtClean="0"/>
+              <a:t>14</a:t>
+            </a:fld>
+            <a:endParaRPr lang="en-US"/>
+          </a:p>
+        </p:txBody>
+      </p:sp>
+      <p:sp>
+        <p:nvSpPr>
+          <p:cNvPr id="6" name="$ valgrind ./main…">
+            <a:extLst>
+              <a:ext uri="{FF2B5EF4-FFF2-40B4-BE49-F238E27FC236}">
+                <a16:creationId xmlns:a16="http://schemas.microsoft.com/office/drawing/2014/main" id="{1F236D35-0826-8A45-8EA9-D6A77687CD3E}"/>
+              </a:ext>
+            </a:extLst>
+          </p:cNvPr>
+          <p:cNvSpPr txBox="1"/>
+          <p:nvPr/>
+        </p:nvSpPr>
+        <p:spPr>
+          <a:xfrm>
+            <a:off x="6281728" y="1500160"/>
+            <a:ext cx="5910272" cy="5729774"/>
+          </a:xfrm>
+          <a:prstGeom prst="rect">
+            <a:avLst/>
+          </a:prstGeom>
+          <a:ln w="12700">
+            <a:miter lim="400000"/>
+          </a:ln>
+          <a:extLst>
+            <a:ext uri="{C572A759-6A51-4108-AA02-DFA0A04FC94B}">
+              <ma14:wrappingTextBoxFlag xmlns:ma14="http://schemas.microsoft.com/office/mac/drawingml/2011/main" xmlns:a14="http://schemas.microsoft.com/office/drawing/2010/main" xmlns:m="http://schemas.openxmlformats.org/officeDocument/2006/math" xmlns="" val="1"/>
+            </a:ext>
+          </a:extLst>
+        </p:spPr>
+        <p:txBody>
+          <a:bodyPr wrap="none" lIns="25400" tIns="25400" rIns="25400" bIns="25400" anchor="ctr">
+            <a:spAutoFit/>
+          </a:bodyPr>
+          <a:lstStyle/>
+          <a:p>
+            <a:pPr algn="l" defTabSz="228600">
+              <a:defRPr sz="1800">
+                <a:solidFill>
+                  <a:srgbClr val="000000"/>
+                </a:solidFill>
+                <a:latin typeface="Menlo Regular"/>
+                <a:ea typeface="Menlo Regular"/>
+                <a:cs typeface="Menlo Regular"/>
+                <a:sym typeface="Menlo Regular"/>
+              </a:defRPr>
+            </a:pPr>
+            <a:r>
+              <a:rPr sz="900" dirty="0">
+                <a:latin typeface="Courier New" panose="02070309020205020404" pitchFamily="49" charset="0"/>
+                <a:cs typeface="Courier New" panose="02070309020205020404" pitchFamily="49" charset="0"/>
+              </a:rPr>
+              <a:t>$ </a:t>
+            </a:r>
+            <a:r>
+              <a:rPr sz="900" dirty="0" err="1">
+                <a:latin typeface="Courier New" panose="02070309020205020404" pitchFamily="49" charset="0"/>
+                <a:cs typeface="Courier New" panose="02070309020205020404" pitchFamily="49" charset="0"/>
+              </a:rPr>
+              <a:t>valgrind</a:t>
+            </a:r>
+            <a:r>
+              <a:rPr sz="900" dirty="0">
+                <a:latin typeface="Courier New" panose="02070309020205020404" pitchFamily="49" charset="0"/>
+                <a:cs typeface="Courier New" panose="02070309020205020404" pitchFamily="49" charset="0"/>
+              </a:rPr>
+              <a:t> ./main</a:t>
+            </a:r>
+          </a:p>
+          <a:p>
+            <a:pPr algn="l" defTabSz="228600">
+              <a:defRPr sz="1800">
+                <a:solidFill>
+                  <a:srgbClr val="000000"/>
+                </a:solidFill>
+                <a:latin typeface="Menlo Regular"/>
+                <a:ea typeface="Menlo Regular"/>
+                <a:cs typeface="Menlo Regular"/>
+                <a:sym typeface="Menlo Regular"/>
+              </a:defRPr>
+            </a:pPr>
+            <a:r>
+              <a:rPr sz="900" dirty="0">
+                <a:latin typeface="Courier New" panose="02070309020205020404" pitchFamily="49" charset="0"/>
+                <a:cs typeface="Courier New" panose="02070309020205020404" pitchFamily="49" charset="0"/>
+              </a:rPr>
+              <a:t>==8515== </a:t>
+            </a:r>
+            <a:r>
+              <a:rPr sz="900" dirty="0" err="1">
+                <a:latin typeface="Courier New" panose="02070309020205020404" pitchFamily="49" charset="0"/>
+                <a:cs typeface="Courier New" panose="02070309020205020404" pitchFamily="49" charset="0"/>
+              </a:rPr>
+              <a:t>Memcheck</a:t>
+            </a:r>
+            <a:r>
+              <a:rPr sz="900" dirty="0">
+                <a:latin typeface="Courier New" panose="02070309020205020404" pitchFamily="49" charset="0"/>
+                <a:cs typeface="Courier New" panose="02070309020205020404" pitchFamily="49" charset="0"/>
+              </a:rPr>
+              <a:t>, a memory error detector</a:t>
+            </a:r>
+          </a:p>
+          <a:p>
+            <a:pPr algn="l" defTabSz="228600">
+              <a:defRPr sz="1800">
+                <a:solidFill>
+                  <a:srgbClr val="000000"/>
+                </a:solidFill>
+                <a:latin typeface="Menlo Regular"/>
+                <a:ea typeface="Menlo Regular"/>
+                <a:cs typeface="Menlo Regular"/>
+                <a:sym typeface="Menlo Regular"/>
+              </a:defRPr>
+            </a:pPr>
+            <a:r>
+              <a:rPr sz="900" dirty="0">
+                <a:latin typeface="Courier New" panose="02070309020205020404" pitchFamily="49" charset="0"/>
+                <a:cs typeface="Courier New" panose="02070309020205020404" pitchFamily="49" charset="0"/>
+              </a:rPr>
+              <a:t>==8515== Copyright (C) 2002-2015, and GNU </a:t>
+            </a:r>
+            <a:r>
+              <a:rPr sz="900" dirty="0" err="1">
+                <a:latin typeface="Courier New" panose="02070309020205020404" pitchFamily="49" charset="0"/>
+                <a:cs typeface="Courier New" panose="02070309020205020404" pitchFamily="49" charset="0"/>
+              </a:rPr>
+              <a:t>GPL'd</a:t>
+            </a:r>
+            <a:r>
+              <a:rPr sz="900" dirty="0">
+                <a:latin typeface="Courier New" panose="02070309020205020404" pitchFamily="49" charset="0"/>
+                <a:cs typeface="Courier New" panose="02070309020205020404" pitchFamily="49" charset="0"/>
+              </a:rPr>
+              <a:t>, by Julian Seward et al.</a:t>
+            </a:r>
+          </a:p>
+          <a:p>
+            <a:pPr algn="l" defTabSz="228600">
+              <a:defRPr sz="1800">
+                <a:solidFill>
+                  <a:srgbClr val="000000"/>
+                </a:solidFill>
+                <a:latin typeface="Menlo Regular"/>
+                <a:ea typeface="Menlo Regular"/>
+                <a:cs typeface="Menlo Regular"/>
+                <a:sym typeface="Menlo Regular"/>
+              </a:defRPr>
+            </a:pPr>
+            <a:r>
+              <a:rPr sz="900" dirty="0">
+                <a:latin typeface="Courier New" panose="02070309020205020404" pitchFamily="49" charset="0"/>
+                <a:cs typeface="Courier New" panose="02070309020205020404" pitchFamily="49" charset="0"/>
+              </a:rPr>
+              <a:t>==8515== Using Valgrind-3.11.0 and </a:t>
+            </a:r>
+            <a:r>
+              <a:rPr sz="900" dirty="0" err="1">
+                <a:latin typeface="Courier New" panose="02070309020205020404" pitchFamily="49" charset="0"/>
+                <a:cs typeface="Courier New" panose="02070309020205020404" pitchFamily="49" charset="0"/>
+              </a:rPr>
+              <a:t>LibVEX</a:t>
+            </a:r>
+            <a:r>
+              <a:rPr sz="900" dirty="0">
+                <a:latin typeface="Courier New" panose="02070309020205020404" pitchFamily="49" charset="0"/>
+                <a:cs typeface="Courier New" panose="02070309020205020404" pitchFamily="49" charset="0"/>
+              </a:rPr>
+              <a:t>; rerun with -h for copyright info</a:t>
+            </a:r>
+          </a:p>
+          <a:p>
+            <a:pPr algn="l" defTabSz="228600">
+              <a:defRPr sz="1800">
+                <a:solidFill>
+                  <a:srgbClr val="000000"/>
+                </a:solidFill>
+                <a:latin typeface="Menlo Regular"/>
+                <a:ea typeface="Menlo Regular"/>
+                <a:cs typeface="Menlo Regular"/>
+                <a:sym typeface="Menlo Regular"/>
+              </a:defRPr>
+            </a:pPr>
+            <a:r>
+              <a:rPr sz="900" dirty="0">
+                <a:latin typeface="Courier New" panose="02070309020205020404" pitchFamily="49" charset="0"/>
+                <a:cs typeface="Courier New" panose="02070309020205020404" pitchFamily="49" charset="0"/>
+              </a:rPr>
+              <a:t>==8515== Command: ./main</a:t>
+            </a:r>
+          </a:p>
+          <a:p>
+            <a:pPr algn="l" defTabSz="228600">
+              <a:defRPr sz="1800">
+                <a:solidFill>
+                  <a:srgbClr val="000000"/>
+                </a:solidFill>
+                <a:latin typeface="Menlo Regular"/>
+                <a:ea typeface="Menlo Regular"/>
+                <a:cs typeface="Menlo Regular"/>
+                <a:sym typeface="Menlo Regular"/>
+              </a:defRPr>
+            </a:pPr>
+            <a:r>
+              <a:rPr sz="900" dirty="0">
+                <a:latin typeface="Courier New" panose="02070309020205020404" pitchFamily="49" charset="0"/>
+                <a:cs typeface="Courier New" panose="02070309020205020404" pitchFamily="49" charset="0"/>
+              </a:rPr>
+              <a:t>==8515==</a:t>
+            </a:r>
+          </a:p>
+          <a:p>
+            <a:pPr algn="l" defTabSz="228600">
+              <a:defRPr sz="1800">
+                <a:solidFill>
+                  <a:srgbClr val="000000"/>
+                </a:solidFill>
+                <a:latin typeface="Menlo Regular"/>
+                <a:ea typeface="Menlo Regular"/>
+                <a:cs typeface="Menlo Regular"/>
+                <a:sym typeface="Menlo Regular"/>
+              </a:defRPr>
+            </a:pPr>
+            <a:r>
+              <a:rPr sz="900" dirty="0">
+                <a:latin typeface="Courier New" panose="02070309020205020404" pitchFamily="49" charset="0"/>
+                <a:cs typeface="Courier New" panose="02070309020205020404" pitchFamily="49" charset="0"/>
+              </a:rPr>
+              <a:t>==8515== Conditional jump or move depends on </a:t>
+            </a:r>
+            <a:r>
+              <a:rPr sz="900" dirty="0" err="1">
+                <a:latin typeface="Courier New" panose="02070309020205020404" pitchFamily="49" charset="0"/>
+                <a:cs typeface="Courier New" panose="02070309020205020404" pitchFamily="49" charset="0"/>
+              </a:rPr>
+              <a:t>uninitialised</a:t>
+            </a:r>
+            <a:r>
+              <a:rPr sz="900" dirty="0">
+                <a:latin typeface="Courier New" panose="02070309020205020404" pitchFamily="49" charset="0"/>
+                <a:cs typeface="Courier New" panose="02070309020205020404" pitchFamily="49" charset="0"/>
+              </a:rPr>
+              <a:t> value(s)</a:t>
+            </a:r>
+          </a:p>
+          <a:p>
+            <a:pPr algn="l" defTabSz="228600">
+              <a:defRPr sz="1800">
+                <a:solidFill>
+                  <a:srgbClr val="000000"/>
+                </a:solidFill>
+                <a:latin typeface="Menlo Regular"/>
+                <a:ea typeface="Menlo Regular"/>
+                <a:cs typeface="Menlo Regular"/>
+                <a:sym typeface="Menlo Regular"/>
+              </a:defRPr>
+            </a:pPr>
+            <a:r>
+              <a:rPr sz="900" dirty="0">
+                <a:latin typeface="Courier New" panose="02070309020205020404" pitchFamily="49" charset="0"/>
+                <a:cs typeface="Courier New" panose="02070309020205020404" pitchFamily="49" charset="0"/>
+              </a:rPr>
+              <a:t>==8515==    at 0x400813: fail() (main.cpp:7)</a:t>
+            </a:r>
+          </a:p>
+          <a:p>
+            <a:pPr algn="l" defTabSz="228600">
+              <a:defRPr sz="1800">
+                <a:solidFill>
+                  <a:srgbClr val="000000"/>
+                </a:solidFill>
+                <a:latin typeface="Menlo Regular"/>
+                <a:ea typeface="Menlo Regular"/>
+                <a:cs typeface="Menlo Regular"/>
+                <a:sym typeface="Menlo Regular"/>
+              </a:defRPr>
+            </a:pPr>
+            <a:r>
+              <a:rPr sz="900" dirty="0">
+                <a:latin typeface="Courier New" panose="02070309020205020404" pitchFamily="49" charset="0"/>
+                <a:cs typeface="Courier New" panose="02070309020205020404" pitchFamily="49" charset="0"/>
+              </a:rPr>
+              <a:t>==8515==    by 0x40083F: main (main.cpp:13)</a:t>
+            </a:r>
+          </a:p>
+          <a:p>
+            <a:pPr algn="l" defTabSz="228600">
+              <a:defRPr sz="1800">
+                <a:solidFill>
+                  <a:srgbClr val="000000"/>
+                </a:solidFill>
+                <a:latin typeface="Menlo Regular"/>
+                <a:ea typeface="Menlo Regular"/>
+                <a:cs typeface="Menlo Regular"/>
+                <a:sym typeface="Menlo Regular"/>
+              </a:defRPr>
+            </a:pPr>
+            <a:r>
+              <a:rPr sz="900" dirty="0">
+                <a:latin typeface="Courier New" panose="02070309020205020404" pitchFamily="49" charset="0"/>
+                <a:cs typeface="Courier New" panose="02070309020205020404" pitchFamily="49" charset="0"/>
+              </a:rPr>
+              <a:t>==8515==</a:t>
+            </a:r>
+          </a:p>
+          <a:p>
+            <a:pPr algn="l" defTabSz="228600">
+              <a:defRPr sz="1800">
+                <a:solidFill>
+                  <a:srgbClr val="000000"/>
+                </a:solidFill>
+                <a:latin typeface="Menlo Regular"/>
+                <a:ea typeface="Menlo Regular"/>
+                <a:cs typeface="Menlo Regular"/>
+                <a:sym typeface="Menlo Regular"/>
+              </a:defRPr>
+            </a:pPr>
+            <a:r>
+              <a:rPr sz="900" dirty="0">
+                <a:latin typeface="Courier New" panose="02070309020205020404" pitchFamily="49" charset="0"/>
+                <a:cs typeface="Courier New" panose="02070309020205020404" pitchFamily="49" charset="0"/>
+              </a:rPr>
+              <a:t>==8515== Invalid read of size 4</a:t>
+            </a:r>
+          </a:p>
+          <a:p>
+            <a:pPr algn="l" defTabSz="228600">
+              <a:defRPr sz="1800">
+                <a:solidFill>
+                  <a:srgbClr val="000000"/>
+                </a:solidFill>
+                <a:latin typeface="Menlo Regular"/>
+                <a:ea typeface="Menlo Regular"/>
+                <a:cs typeface="Menlo Regular"/>
+                <a:sym typeface="Menlo Regular"/>
+              </a:defRPr>
+            </a:pPr>
+            <a:r>
+              <a:rPr sz="900" dirty="0">
+                <a:latin typeface="Courier New" panose="02070309020205020404" pitchFamily="49" charset="0"/>
+                <a:cs typeface="Courier New" panose="02070309020205020404" pitchFamily="49" charset="0"/>
+              </a:rPr>
+              <a:t>==8515==    at 0x400819: fail() (main.cpp:8)</a:t>
+            </a:r>
+          </a:p>
+          <a:p>
+            <a:pPr algn="l" defTabSz="228600">
+              <a:defRPr sz="1800">
+                <a:solidFill>
+                  <a:srgbClr val="000000"/>
+                </a:solidFill>
+                <a:latin typeface="Menlo Regular"/>
+                <a:ea typeface="Menlo Regular"/>
+                <a:cs typeface="Menlo Regular"/>
+                <a:sym typeface="Menlo Regular"/>
+              </a:defRPr>
+            </a:pPr>
+            <a:r>
+              <a:rPr sz="900" dirty="0">
+                <a:latin typeface="Courier New" panose="02070309020205020404" pitchFamily="49" charset="0"/>
+                <a:cs typeface="Courier New" panose="02070309020205020404" pitchFamily="49" charset="0"/>
+              </a:rPr>
+              <a:t>==8515==    by 0x40083F: main (main.cpp:13)</a:t>
+            </a:r>
+          </a:p>
+          <a:p>
+            <a:pPr algn="l" defTabSz="228600">
+              <a:defRPr sz="1800">
+                <a:solidFill>
+                  <a:srgbClr val="000000"/>
+                </a:solidFill>
+                <a:latin typeface="Menlo Regular"/>
+                <a:ea typeface="Menlo Regular"/>
+                <a:cs typeface="Menlo Regular"/>
+                <a:sym typeface="Menlo Regular"/>
+              </a:defRPr>
+            </a:pPr>
+            <a:r>
+              <a:rPr sz="900" dirty="0">
+                <a:latin typeface="Courier New" panose="02070309020205020404" pitchFamily="49" charset="0"/>
+                <a:cs typeface="Courier New" panose="02070309020205020404" pitchFamily="49" charset="0"/>
+              </a:rPr>
+              <a:t>==8515==  Address 0x0 is not </a:t>
+            </a:r>
+            <a:r>
+              <a:rPr sz="900" dirty="0" err="1">
+                <a:latin typeface="Courier New" panose="02070309020205020404" pitchFamily="49" charset="0"/>
+                <a:cs typeface="Courier New" panose="02070309020205020404" pitchFamily="49" charset="0"/>
+              </a:rPr>
+              <a:t>stack'd</a:t>
+            </a:r>
+            <a:r>
+              <a:rPr sz="900" dirty="0">
+                <a:latin typeface="Courier New" panose="02070309020205020404" pitchFamily="49" charset="0"/>
+                <a:cs typeface="Courier New" panose="02070309020205020404" pitchFamily="49" charset="0"/>
+              </a:rPr>
+              <a:t>, </a:t>
+            </a:r>
+            <a:r>
+              <a:rPr sz="900" dirty="0" err="1">
+                <a:latin typeface="Courier New" panose="02070309020205020404" pitchFamily="49" charset="0"/>
+                <a:cs typeface="Courier New" panose="02070309020205020404" pitchFamily="49" charset="0"/>
+              </a:rPr>
+              <a:t>malloc'd</a:t>
+            </a:r>
+            <a:r>
+              <a:rPr sz="900" dirty="0">
+                <a:latin typeface="Courier New" panose="02070309020205020404" pitchFamily="49" charset="0"/>
+                <a:cs typeface="Courier New" panose="02070309020205020404" pitchFamily="49" charset="0"/>
+              </a:rPr>
+              <a:t> or (recently) </a:t>
+            </a:r>
+            <a:r>
+              <a:rPr sz="900" dirty="0" err="1">
+                <a:latin typeface="Courier New" panose="02070309020205020404" pitchFamily="49" charset="0"/>
+                <a:cs typeface="Courier New" panose="02070309020205020404" pitchFamily="49" charset="0"/>
+              </a:rPr>
+              <a:t>free'd</a:t>
+            </a:r>
+            <a:endParaRPr sz="900" dirty="0">
+              <a:latin typeface="Courier New" panose="02070309020205020404" pitchFamily="49" charset="0"/>
+              <a:cs typeface="Courier New" panose="02070309020205020404" pitchFamily="49" charset="0"/>
+            </a:endParaRPr>
+          </a:p>
+          <a:p>
+            <a:pPr algn="l" defTabSz="228600">
+              <a:defRPr sz="1800">
+                <a:solidFill>
+                  <a:srgbClr val="000000"/>
+                </a:solidFill>
+                <a:latin typeface="Menlo Regular"/>
+                <a:ea typeface="Menlo Regular"/>
+                <a:cs typeface="Menlo Regular"/>
+                <a:sym typeface="Menlo Regular"/>
+              </a:defRPr>
+            </a:pPr>
+            <a:r>
+              <a:rPr sz="900" dirty="0">
+                <a:latin typeface="Courier New" panose="02070309020205020404" pitchFamily="49" charset="0"/>
+                <a:cs typeface="Courier New" panose="02070309020205020404" pitchFamily="49" charset="0"/>
+              </a:rPr>
+              <a:t>==8515==</a:t>
+            </a:r>
+          </a:p>
+          <a:p>
+            <a:pPr algn="l" defTabSz="228600">
+              <a:defRPr sz="1800">
+                <a:solidFill>
+                  <a:srgbClr val="000000"/>
+                </a:solidFill>
+                <a:latin typeface="Menlo Regular"/>
+                <a:ea typeface="Menlo Regular"/>
+                <a:cs typeface="Menlo Regular"/>
+                <a:sym typeface="Menlo Regular"/>
+              </a:defRPr>
+            </a:pPr>
+            <a:r>
+              <a:rPr sz="900" dirty="0">
+                <a:latin typeface="Courier New" panose="02070309020205020404" pitchFamily="49" charset="0"/>
+                <a:cs typeface="Courier New" panose="02070309020205020404" pitchFamily="49" charset="0"/>
+              </a:rPr>
+              <a:t>==8515==</a:t>
+            </a:r>
+          </a:p>
+          <a:p>
+            <a:pPr algn="l" defTabSz="228600">
+              <a:defRPr sz="1800">
+                <a:solidFill>
+                  <a:srgbClr val="000000"/>
+                </a:solidFill>
+                <a:latin typeface="Menlo Regular"/>
+                <a:ea typeface="Menlo Regular"/>
+                <a:cs typeface="Menlo Regular"/>
+                <a:sym typeface="Menlo Regular"/>
+              </a:defRPr>
+            </a:pPr>
+            <a:r>
+              <a:rPr sz="900" dirty="0">
+                <a:latin typeface="Courier New" panose="02070309020205020404" pitchFamily="49" charset="0"/>
+                <a:cs typeface="Courier New" panose="02070309020205020404" pitchFamily="49" charset="0"/>
+              </a:rPr>
+              <a:t>==8515== Process terminating with default action of signal 11 (SIGSEGV): dumping core</a:t>
+            </a:r>
+          </a:p>
+          <a:p>
+            <a:pPr algn="l" defTabSz="228600">
+              <a:defRPr sz="1800">
+                <a:solidFill>
+                  <a:srgbClr val="000000"/>
+                </a:solidFill>
+                <a:latin typeface="Menlo Regular"/>
+                <a:ea typeface="Menlo Regular"/>
+                <a:cs typeface="Menlo Regular"/>
+                <a:sym typeface="Menlo Regular"/>
+              </a:defRPr>
+            </a:pPr>
+            <a:r>
+              <a:rPr sz="900" dirty="0">
+                <a:latin typeface="Courier New" panose="02070309020205020404" pitchFamily="49" charset="0"/>
+                <a:cs typeface="Courier New" panose="02070309020205020404" pitchFamily="49" charset="0"/>
+              </a:rPr>
+              <a:t>==8515==  Access not within mapped region at address 0x0</a:t>
+            </a:r>
+          </a:p>
+          <a:p>
+            <a:pPr algn="l" defTabSz="228600">
+              <a:defRPr sz="1800">
+                <a:solidFill>
+                  <a:srgbClr val="000000"/>
+                </a:solidFill>
+                <a:latin typeface="Menlo Regular"/>
+                <a:ea typeface="Menlo Regular"/>
+                <a:cs typeface="Menlo Regular"/>
+                <a:sym typeface="Menlo Regular"/>
+              </a:defRPr>
+            </a:pPr>
+            <a:r>
+              <a:rPr sz="900" dirty="0">
+                <a:latin typeface="Courier New" panose="02070309020205020404" pitchFamily="49" charset="0"/>
+                <a:cs typeface="Courier New" panose="02070309020205020404" pitchFamily="49" charset="0"/>
+              </a:rPr>
+              <a:t>==8515==    at 0x400819: fail() (main.cpp:8)</a:t>
+            </a:r>
+          </a:p>
+          <a:p>
+            <a:pPr algn="l" defTabSz="228600">
+              <a:defRPr sz="1800">
+                <a:solidFill>
+                  <a:srgbClr val="000000"/>
+                </a:solidFill>
+                <a:latin typeface="Menlo Regular"/>
+                <a:ea typeface="Menlo Regular"/>
+                <a:cs typeface="Menlo Regular"/>
+                <a:sym typeface="Menlo Regular"/>
+              </a:defRPr>
+            </a:pPr>
+            <a:r>
+              <a:rPr sz="900" dirty="0">
+                <a:latin typeface="Courier New" panose="02070309020205020404" pitchFamily="49" charset="0"/>
+                <a:cs typeface="Courier New" panose="02070309020205020404" pitchFamily="49" charset="0"/>
+              </a:rPr>
+              <a:t>==8515==    by 0x40083F: main (main.cpp:13)</a:t>
+            </a:r>
+          </a:p>
+          <a:p>
+            <a:pPr algn="l" defTabSz="228600">
+              <a:defRPr sz="1800">
+                <a:solidFill>
+                  <a:srgbClr val="000000"/>
+                </a:solidFill>
+                <a:latin typeface="Menlo Regular"/>
+                <a:ea typeface="Menlo Regular"/>
+                <a:cs typeface="Menlo Regular"/>
+                <a:sym typeface="Menlo Regular"/>
+              </a:defRPr>
+            </a:pPr>
+            <a:r>
+              <a:rPr sz="900" dirty="0">
+                <a:latin typeface="Courier New" panose="02070309020205020404" pitchFamily="49" charset="0"/>
+                <a:cs typeface="Courier New" panose="02070309020205020404" pitchFamily="49" charset="0"/>
+              </a:rPr>
+              <a:t>==8515==  If you believe this happened as a result of a stack</a:t>
+            </a:r>
+          </a:p>
+          <a:p>
+            <a:pPr algn="l" defTabSz="228600">
+              <a:defRPr sz="1800">
+                <a:solidFill>
+                  <a:srgbClr val="000000"/>
+                </a:solidFill>
+                <a:latin typeface="Menlo Regular"/>
+                <a:ea typeface="Menlo Regular"/>
+                <a:cs typeface="Menlo Regular"/>
+                <a:sym typeface="Menlo Regular"/>
+              </a:defRPr>
+            </a:pPr>
+            <a:r>
+              <a:rPr sz="900" dirty="0">
+                <a:latin typeface="Courier New" panose="02070309020205020404" pitchFamily="49" charset="0"/>
+                <a:cs typeface="Courier New" panose="02070309020205020404" pitchFamily="49" charset="0"/>
+              </a:rPr>
+              <a:t>==8515==  overflow in your program's main thread (unlikely but</a:t>
+            </a:r>
+          </a:p>
+          <a:p>
+            <a:pPr algn="l" defTabSz="228600">
+              <a:defRPr sz="1800">
+                <a:solidFill>
+                  <a:srgbClr val="000000"/>
+                </a:solidFill>
+                <a:latin typeface="Menlo Regular"/>
+                <a:ea typeface="Menlo Regular"/>
+                <a:cs typeface="Menlo Regular"/>
+                <a:sym typeface="Menlo Regular"/>
+              </a:defRPr>
+            </a:pPr>
+            <a:r>
+              <a:rPr sz="900" dirty="0">
+                <a:latin typeface="Courier New" panose="02070309020205020404" pitchFamily="49" charset="0"/>
+                <a:cs typeface="Courier New" panose="02070309020205020404" pitchFamily="49" charset="0"/>
+              </a:rPr>
+              <a:t>==8515==  possible), you can try to increase the size of the</a:t>
+            </a:r>
+          </a:p>
+          <a:p>
+            <a:pPr algn="l" defTabSz="228600">
+              <a:defRPr sz="1800">
+                <a:solidFill>
+                  <a:srgbClr val="000000"/>
+                </a:solidFill>
+                <a:latin typeface="Menlo Regular"/>
+                <a:ea typeface="Menlo Regular"/>
+                <a:cs typeface="Menlo Regular"/>
+                <a:sym typeface="Menlo Regular"/>
+              </a:defRPr>
+            </a:pPr>
+            <a:r>
+              <a:rPr sz="900" dirty="0">
+                <a:latin typeface="Courier New" panose="02070309020205020404" pitchFamily="49" charset="0"/>
+                <a:cs typeface="Courier New" panose="02070309020205020404" pitchFamily="49" charset="0"/>
+              </a:rPr>
+              <a:t>==8515==  main thread stack using the --main-</a:t>
+            </a:r>
+            <a:r>
+              <a:rPr sz="900" dirty="0" err="1">
+                <a:latin typeface="Courier New" panose="02070309020205020404" pitchFamily="49" charset="0"/>
+                <a:cs typeface="Courier New" panose="02070309020205020404" pitchFamily="49" charset="0"/>
+              </a:rPr>
+              <a:t>stacksize</a:t>
+            </a:r>
+            <a:r>
+              <a:rPr sz="900" dirty="0">
+                <a:latin typeface="Courier New" panose="02070309020205020404" pitchFamily="49" charset="0"/>
+                <a:cs typeface="Courier New" panose="02070309020205020404" pitchFamily="49" charset="0"/>
+              </a:rPr>
+              <a:t>= flag.</a:t>
+            </a:r>
+          </a:p>
+          <a:p>
+            <a:pPr algn="l" defTabSz="228600">
+              <a:defRPr sz="1800">
+                <a:solidFill>
+                  <a:srgbClr val="000000"/>
+                </a:solidFill>
+                <a:latin typeface="Menlo Regular"/>
+                <a:ea typeface="Menlo Regular"/>
+                <a:cs typeface="Menlo Regular"/>
+                <a:sym typeface="Menlo Regular"/>
+              </a:defRPr>
+            </a:pPr>
+            <a:r>
+              <a:rPr sz="900" dirty="0">
+                <a:latin typeface="Courier New" panose="02070309020205020404" pitchFamily="49" charset="0"/>
+                <a:cs typeface="Courier New" panose="02070309020205020404" pitchFamily="49" charset="0"/>
+              </a:rPr>
+              <a:t>==8515==  The main thread stack size used in this run was 8388608.</a:t>
+            </a:r>
+          </a:p>
+          <a:p>
+            <a:pPr algn="l" defTabSz="228600">
+              <a:defRPr sz="1800">
+                <a:solidFill>
+                  <a:srgbClr val="000000"/>
+                </a:solidFill>
+                <a:latin typeface="Menlo Regular"/>
+                <a:ea typeface="Menlo Regular"/>
+                <a:cs typeface="Menlo Regular"/>
+                <a:sym typeface="Menlo Regular"/>
+              </a:defRPr>
+            </a:pPr>
+            <a:r>
+              <a:rPr sz="900" dirty="0">
+                <a:latin typeface="Courier New" panose="02070309020205020404" pitchFamily="49" charset="0"/>
+                <a:cs typeface="Courier New" panose="02070309020205020404" pitchFamily="49" charset="0"/>
+              </a:rPr>
+              <a:t>==8515==</a:t>
+            </a:r>
+          </a:p>
+          <a:p>
+            <a:pPr algn="l" defTabSz="228600">
+              <a:defRPr sz="1800">
+                <a:solidFill>
+                  <a:srgbClr val="000000"/>
+                </a:solidFill>
+                <a:latin typeface="Menlo Regular"/>
+                <a:ea typeface="Menlo Regular"/>
+                <a:cs typeface="Menlo Regular"/>
+                <a:sym typeface="Menlo Regular"/>
+              </a:defRPr>
+            </a:pPr>
+            <a:r>
+              <a:rPr sz="900" dirty="0">
+                <a:latin typeface="Courier New" panose="02070309020205020404" pitchFamily="49" charset="0"/>
+                <a:cs typeface="Courier New" panose="02070309020205020404" pitchFamily="49" charset="0"/>
+              </a:rPr>
+              <a:t>==8515== HEAP SUMMARY:</a:t>
+            </a:r>
+          </a:p>
+          <a:p>
+            <a:pPr algn="l" defTabSz="228600">
+              <a:defRPr sz="1800">
+                <a:solidFill>
+                  <a:srgbClr val="000000"/>
+                </a:solidFill>
+                <a:latin typeface="Menlo Regular"/>
+                <a:ea typeface="Menlo Regular"/>
+                <a:cs typeface="Menlo Regular"/>
+                <a:sym typeface="Menlo Regular"/>
+              </a:defRPr>
+            </a:pPr>
+            <a:r>
+              <a:rPr sz="900" dirty="0">
+                <a:latin typeface="Courier New" panose="02070309020205020404" pitchFamily="49" charset="0"/>
+                <a:cs typeface="Courier New" panose="02070309020205020404" pitchFamily="49" charset="0"/>
+              </a:rPr>
+              <a:t>==8515==     in use at exit: 72,704 bytes in 1 blocks</a:t>
+            </a:r>
+          </a:p>
+          <a:p>
+            <a:pPr algn="l" defTabSz="228600">
+              <a:defRPr sz="1800">
+                <a:solidFill>
+                  <a:srgbClr val="000000"/>
+                </a:solidFill>
+                <a:latin typeface="Menlo Regular"/>
+                <a:ea typeface="Menlo Regular"/>
+                <a:cs typeface="Menlo Regular"/>
+                <a:sym typeface="Menlo Regular"/>
+              </a:defRPr>
+            </a:pPr>
+            <a:r>
+              <a:rPr sz="900" dirty="0">
+                <a:latin typeface="Courier New" panose="02070309020205020404" pitchFamily="49" charset="0"/>
+                <a:cs typeface="Courier New" panose="02070309020205020404" pitchFamily="49" charset="0"/>
+              </a:rPr>
+              <a:t>==8515==   total heap usage: 1 </a:t>
+            </a:r>
+            <a:r>
+              <a:rPr sz="900" dirty="0" err="1">
+                <a:latin typeface="Courier New" panose="02070309020205020404" pitchFamily="49" charset="0"/>
+                <a:cs typeface="Courier New" panose="02070309020205020404" pitchFamily="49" charset="0"/>
+              </a:rPr>
+              <a:t>allocs</a:t>
+            </a:r>
+            <a:r>
+              <a:rPr sz="900" dirty="0">
+                <a:latin typeface="Courier New" panose="02070309020205020404" pitchFamily="49" charset="0"/>
+                <a:cs typeface="Courier New" panose="02070309020205020404" pitchFamily="49" charset="0"/>
+              </a:rPr>
+              <a:t>, 0 frees, 72,704 bytes allocated</a:t>
+            </a:r>
+          </a:p>
+          <a:p>
+            <a:pPr algn="l" defTabSz="228600">
+              <a:defRPr sz="1800">
+                <a:solidFill>
+                  <a:srgbClr val="000000"/>
+                </a:solidFill>
+                <a:latin typeface="Menlo Regular"/>
+                <a:ea typeface="Menlo Regular"/>
+                <a:cs typeface="Menlo Regular"/>
+                <a:sym typeface="Menlo Regular"/>
+              </a:defRPr>
+            </a:pPr>
+            <a:r>
+              <a:rPr sz="900" dirty="0">
+                <a:latin typeface="Courier New" panose="02070309020205020404" pitchFamily="49" charset="0"/>
+                <a:cs typeface="Courier New" panose="02070309020205020404" pitchFamily="49" charset="0"/>
+              </a:rPr>
+              <a:t>==8515==</a:t>
+            </a:r>
+          </a:p>
+          <a:p>
+            <a:pPr algn="l" defTabSz="228600">
+              <a:defRPr sz="1800">
+                <a:solidFill>
+                  <a:srgbClr val="000000"/>
+                </a:solidFill>
+                <a:latin typeface="Menlo Regular"/>
+                <a:ea typeface="Menlo Regular"/>
+                <a:cs typeface="Menlo Regular"/>
+                <a:sym typeface="Menlo Regular"/>
+              </a:defRPr>
+            </a:pPr>
+            <a:r>
+              <a:rPr sz="900" dirty="0">
+                <a:latin typeface="Courier New" panose="02070309020205020404" pitchFamily="49" charset="0"/>
+                <a:cs typeface="Courier New" panose="02070309020205020404" pitchFamily="49" charset="0"/>
+              </a:rPr>
+              <a:t>==8515== LEAK SUMMARY:</a:t>
+            </a:r>
+          </a:p>
+          <a:p>
+            <a:pPr algn="l" defTabSz="228600">
+              <a:defRPr sz="1800">
+                <a:solidFill>
+                  <a:srgbClr val="000000"/>
+                </a:solidFill>
+                <a:latin typeface="Menlo Regular"/>
+                <a:ea typeface="Menlo Regular"/>
+                <a:cs typeface="Menlo Regular"/>
+                <a:sym typeface="Menlo Regular"/>
+              </a:defRPr>
+            </a:pPr>
+            <a:r>
+              <a:rPr sz="900" dirty="0">
+                <a:latin typeface="Courier New" panose="02070309020205020404" pitchFamily="49" charset="0"/>
+                <a:cs typeface="Courier New" panose="02070309020205020404" pitchFamily="49" charset="0"/>
+              </a:rPr>
+              <a:t>==8515==    definitely lost: 0 bytes in 0 blocks</a:t>
+            </a:r>
+          </a:p>
+          <a:p>
+            <a:pPr algn="l" defTabSz="228600">
+              <a:defRPr sz="1800">
+                <a:solidFill>
+                  <a:srgbClr val="000000"/>
+                </a:solidFill>
+                <a:latin typeface="Menlo Regular"/>
+                <a:ea typeface="Menlo Regular"/>
+                <a:cs typeface="Menlo Regular"/>
+                <a:sym typeface="Menlo Regular"/>
+              </a:defRPr>
+            </a:pPr>
+            <a:r>
+              <a:rPr sz="900" dirty="0">
+                <a:latin typeface="Courier New" panose="02070309020205020404" pitchFamily="49" charset="0"/>
+                <a:cs typeface="Courier New" panose="02070309020205020404" pitchFamily="49" charset="0"/>
+              </a:rPr>
+              <a:t>==8515==    indirectly lost: 0 bytes in 0 blocks</a:t>
+            </a:r>
+          </a:p>
+          <a:p>
+            <a:pPr algn="l" defTabSz="228600">
+              <a:defRPr sz="1800">
+                <a:solidFill>
+                  <a:srgbClr val="000000"/>
+                </a:solidFill>
+                <a:latin typeface="Menlo Regular"/>
+                <a:ea typeface="Menlo Regular"/>
+                <a:cs typeface="Menlo Regular"/>
+                <a:sym typeface="Menlo Regular"/>
+              </a:defRPr>
+            </a:pPr>
+            <a:r>
+              <a:rPr sz="900" dirty="0">
+                <a:latin typeface="Courier New" panose="02070309020205020404" pitchFamily="49" charset="0"/>
+                <a:cs typeface="Courier New" panose="02070309020205020404" pitchFamily="49" charset="0"/>
+              </a:rPr>
+              <a:t>==8515==      possibly lost: 0 bytes in 0 blocks</a:t>
+            </a:r>
+          </a:p>
+          <a:p>
+            <a:pPr algn="l" defTabSz="228600">
+              <a:defRPr sz="1800">
+                <a:solidFill>
+                  <a:srgbClr val="000000"/>
+                </a:solidFill>
+                <a:latin typeface="Menlo Regular"/>
+                <a:ea typeface="Menlo Regular"/>
+                <a:cs typeface="Menlo Regular"/>
+                <a:sym typeface="Menlo Regular"/>
+              </a:defRPr>
+            </a:pPr>
+            <a:r>
+              <a:rPr sz="900" dirty="0">
+                <a:latin typeface="Courier New" panose="02070309020205020404" pitchFamily="49" charset="0"/>
+                <a:cs typeface="Courier New" panose="02070309020205020404" pitchFamily="49" charset="0"/>
+              </a:rPr>
+              <a:t>==8515==    still reachable: 72,704 bytes in 1 blocks</a:t>
+            </a:r>
+          </a:p>
+          <a:p>
+            <a:pPr algn="l" defTabSz="228600">
+              <a:defRPr sz="1800">
+                <a:solidFill>
+                  <a:srgbClr val="000000"/>
+                </a:solidFill>
+                <a:latin typeface="Menlo Regular"/>
+                <a:ea typeface="Menlo Regular"/>
+                <a:cs typeface="Menlo Regular"/>
+                <a:sym typeface="Menlo Regular"/>
+              </a:defRPr>
+            </a:pPr>
+            <a:r>
+              <a:rPr sz="900" dirty="0">
+                <a:latin typeface="Courier New" panose="02070309020205020404" pitchFamily="49" charset="0"/>
+                <a:cs typeface="Courier New" panose="02070309020205020404" pitchFamily="49" charset="0"/>
+              </a:rPr>
+              <a:t>==8515==         suppressed: 0 bytes in 0 blocks</a:t>
+            </a:r>
+          </a:p>
+          <a:p>
+            <a:pPr algn="l" defTabSz="228600">
+              <a:defRPr sz="1800">
+                <a:solidFill>
+                  <a:srgbClr val="000000"/>
+                </a:solidFill>
+                <a:latin typeface="Menlo Regular"/>
+                <a:ea typeface="Menlo Regular"/>
+                <a:cs typeface="Menlo Regular"/>
+                <a:sym typeface="Menlo Regular"/>
+              </a:defRPr>
+            </a:pPr>
+            <a:r>
+              <a:rPr sz="900" dirty="0">
+                <a:latin typeface="Courier New" panose="02070309020205020404" pitchFamily="49" charset="0"/>
+                <a:cs typeface="Courier New" panose="02070309020205020404" pitchFamily="49" charset="0"/>
+              </a:rPr>
+              <a:t>==8515== Rerun with --leak-check=full to see details of leaked memory</a:t>
+            </a:r>
+          </a:p>
+          <a:p>
+            <a:pPr algn="l" defTabSz="228600">
+              <a:defRPr sz="1800">
+                <a:solidFill>
+                  <a:srgbClr val="000000"/>
+                </a:solidFill>
+                <a:latin typeface="Menlo Regular"/>
+                <a:ea typeface="Menlo Regular"/>
+                <a:cs typeface="Menlo Regular"/>
+                <a:sym typeface="Menlo Regular"/>
+              </a:defRPr>
+            </a:pPr>
+            <a:r>
+              <a:rPr sz="900" dirty="0">
+                <a:latin typeface="Courier New" panose="02070309020205020404" pitchFamily="49" charset="0"/>
+                <a:cs typeface="Courier New" panose="02070309020205020404" pitchFamily="49" charset="0"/>
+              </a:rPr>
+              <a:t>==8515==</a:t>
+            </a:r>
+          </a:p>
+          <a:p>
+            <a:pPr algn="l" defTabSz="228600">
+              <a:defRPr sz="1800">
+                <a:solidFill>
+                  <a:srgbClr val="000000"/>
+                </a:solidFill>
+                <a:latin typeface="Menlo Regular"/>
+                <a:ea typeface="Menlo Regular"/>
+                <a:cs typeface="Menlo Regular"/>
+                <a:sym typeface="Menlo Regular"/>
+              </a:defRPr>
+            </a:pPr>
+            <a:r>
+              <a:rPr sz="900" dirty="0">
+                <a:latin typeface="Courier New" panose="02070309020205020404" pitchFamily="49" charset="0"/>
+                <a:cs typeface="Courier New" panose="02070309020205020404" pitchFamily="49" charset="0"/>
+              </a:rPr>
+              <a:t>==8515== For counts of detected and suppressed errors, rerun with: -v</a:t>
+            </a:r>
+          </a:p>
+          <a:p>
+            <a:pPr algn="l" defTabSz="228600">
+              <a:defRPr sz="1800">
+                <a:solidFill>
+                  <a:srgbClr val="000000"/>
+                </a:solidFill>
+                <a:latin typeface="Menlo Regular"/>
+                <a:ea typeface="Menlo Regular"/>
+                <a:cs typeface="Menlo Regular"/>
+                <a:sym typeface="Menlo Regular"/>
+              </a:defRPr>
+            </a:pPr>
+            <a:r>
+              <a:rPr sz="900" dirty="0">
+                <a:latin typeface="Courier New" panose="02070309020205020404" pitchFamily="49" charset="0"/>
+                <a:cs typeface="Courier New" panose="02070309020205020404" pitchFamily="49" charset="0"/>
+              </a:rPr>
+              <a:t>==8515== Use --track-origins=yes to see where </a:t>
+            </a:r>
+            <a:r>
+              <a:rPr sz="900" dirty="0" err="1">
+                <a:latin typeface="Courier New" panose="02070309020205020404" pitchFamily="49" charset="0"/>
+                <a:cs typeface="Courier New" panose="02070309020205020404" pitchFamily="49" charset="0"/>
+              </a:rPr>
+              <a:t>uninitialised</a:t>
+            </a:r>
+            <a:r>
+              <a:rPr sz="900" dirty="0">
+                <a:latin typeface="Courier New" panose="02070309020205020404" pitchFamily="49" charset="0"/>
+                <a:cs typeface="Courier New" panose="02070309020205020404" pitchFamily="49" charset="0"/>
+              </a:rPr>
+              <a:t> values come from</a:t>
+            </a:r>
+          </a:p>
+          <a:p>
+            <a:pPr algn="l" defTabSz="228600">
+              <a:defRPr sz="1800">
+                <a:solidFill>
+                  <a:srgbClr val="000000"/>
+                </a:solidFill>
+                <a:latin typeface="Menlo Regular"/>
+                <a:ea typeface="Menlo Regular"/>
+                <a:cs typeface="Menlo Regular"/>
+                <a:sym typeface="Menlo Regular"/>
+              </a:defRPr>
+            </a:pPr>
+            <a:r>
+              <a:rPr sz="900" dirty="0">
+                <a:latin typeface="Courier New" panose="02070309020205020404" pitchFamily="49" charset="0"/>
+                <a:cs typeface="Courier New" panose="02070309020205020404" pitchFamily="49" charset="0"/>
+              </a:rPr>
+              <a:t>==8515== ERROR SUMMARY: 2 errors from 2 contexts (suppressed: 0 from 0)</a:t>
+            </a:r>
+          </a:p>
+        </p:txBody>
+      </p:sp>
+      <p:sp>
+        <p:nvSpPr>
+          <p:cNvPr id="7" name="$ ./main…">
+            <a:extLst>
+              <a:ext uri="{FF2B5EF4-FFF2-40B4-BE49-F238E27FC236}">
+                <a16:creationId xmlns:a16="http://schemas.microsoft.com/office/drawing/2014/main" id="{A0036037-A7B2-3741-96D0-FBCA262A0733}"/>
+              </a:ext>
+            </a:extLst>
+          </p:cNvPr>
+          <p:cNvSpPr txBox="1"/>
+          <p:nvPr/>
+        </p:nvSpPr>
+        <p:spPr>
+          <a:xfrm>
+            <a:off x="838200" y="1929962"/>
+            <a:ext cx="3385542" cy="466794"/>
+          </a:xfrm>
+          <a:prstGeom prst="rect">
+            <a:avLst/>
+          </a:prstGeom>
+          <a:ln w="12700">
+            <a:miter lim="400000"/>
+          </a:ln>
+          <a:extLst>
+            <a:ext uri="{C572A759-6A51-4108-AA02-DFA0A04FC94B}">
+              <ma14:wrappingTextBoxFlag xmlns:ma14="http://schemas.microsoft.com/office/mac/drawingml/2011/main" xmlns:a14="http://schemas.microsoft.com/office/drawing/2010/main" xmlns:m="http://schemas.openxmlformats.org/officeDocument/2006/math" xmlns="" val="1"/>
+            </a:ext>
+          </a:extLst>
+        </p:spPr>
+        <p:txBody>
+          <a:bodyPr wrap="none" lIns="25400" tIns="25400" rIns="25400" bIns="25400" anchor="ctr">
+            <a:spAutoFit/>
+          </a:bodyPr>
+          <a:lstStyle/>
+          <a:p>
+            <a:pPr algn="l" defTabSz="228600">
+              <a:defRPr sz="2700">
+                <a:solidFill>
+                  <a:srgbClr val="000000"/>
+                </a:solidFill>
+                <a:latin typeface="Menlo Regular"/>
+                <a:ea typeface="Menlo Regular"/>
+                <a:cs typeface="Menlo Regular"/>
+                <a:sym typeface="Menlo Regular"/>
+              </a:defRPr>
+            </a:pPr>
+            <a:r>
+              <a:rPr sz="1350" dirty="0">
+                <a:latin typeface="Courier New" panose="02070309020205020404" pitchFamily="49" charset="0"/>
+                <a:cs typeface="Courier New" panose="02070309020205020404" pitchFamily="49" charset="0"/>
+              </a:rPr>
+              <a:t>$ ./main</a:t>
+            </a:r>
+          </a:p>
+          <a:p>
+            <a:pPr algn="l" defTabSz="228600">
+              <a:defRPr sz="2700">
+                <a:solidFill>
+                  <a:srgbClr val="000000"/>
+                </a:solidFill>
+                <a:latin typeface="Menlo Regular"/>
+                <a:ea typeface="Menlo Regular"/>
+                <a:cs typeface="Menlo Regular"/>
+                <a:sym typeface="Menlo Regular"/>
+              </a:defRPr>
+            </a:pPr>
+            <a:r>
+              <a:rPr sz="1350" dirty="0">
+                <a:latin typeface="Courier New" panose="02070309020205020404" pitchFamily="49" charset="0"/>
+                <a:cs typeface="Courier New" panose="02070309020205020404" pitchFamily="49" charset="0"/>
+              </a:rPr>
+              <a:t>Segmentation fault (core dumped)</a:t>
+            </a:r>
+          </a:p>
+        </p:txBody>
+      </p:sp>
+      <p:sp>
+        <p:nvSpPr>
+          <p:cNvPr id="8" name="https://www.valgrind.org/info/tools.html">
+            <a:extLst>
+              <a:ext uri="{FF2B5EF4-FFF2-40B4-BE49-F238E27FC236}">
+                <a16:creationId xmlns:a16="http://schemas.microsoft.com/office/drawing/2014/main" id="{9F4642F3-E875-9047-8AB3-AD2894107E18}"/>
+              </a:ext>
+            </a:extLst>
+          </p:cNvPr>
+          <p:cNvSpPr txBox="1"/>
+          <p:nvPr/>
+        </p:nvSpPr>
+        <p:spPr>
+          <a:xfrm>
+            <a:off x="1547198" y="6341573"/>
+            <a:ext cx="1423467" cy="143629"/>
+          </a:xfrm>
+          <a:prstGeom prst="rect">
+            <a:avLst/>
+          </a:prstGeom>
+          <a:ln w="12700">
+            <a:miter lim="400000"/>
+          </a:ln>
+          <a:extLst>
+            <a:ext uri="{C572A759-6A51-4108-AA02-DFA0A04FC94B}">
+              <ma14:wrappingTextBoxFlag xmlns:ma14="http://schemas.microsoft.com/office/mac/drawingml/2011/main" xmlns:a14="http://schemas.microsoft.com/office/drawing/2010/main" xmlns:m="http://schemas.openxmlformats.org/officeDocument/2006/math" xmlns="" val="1"/>
+            </a:ext>
+          </a:extLst>
+        </p:spPr>
+        <p:txBody>
+          <a:bodyPr wrap="none" lIns="25400" tIns="25400" rIns="25400" bIns="25400" anchor="ctr">
+            <a:spAutoFit/>
+          </a:bodyPr>
+          <a:lstStyle>
+            <a:lvl1pPr>
+              <a:defRPr u="sng">
+                <a:hlinkClick r:id=""/>
+              </a:defRPr>
+            </a:lvl1pPr>
+          </a:lstStyle>
+          <a:p>
+            <a:pPr>
+              <a:defRPr u="none"/>
+            </a:pPr>
+            <a:r>
+              <a:rPr sz="600"/>
+              <a:t>https://www.valgrind.org/info/tools.html</a:t>
+            </a:r>
+          </a:p>
+        </p:txBody>
+      </p:sp>
+      <p:sp>
+        <p:nvSpPr>
+          <p:cNvPr id="10" name="TextBox 9">
+            <a:extLst>
+              <a:ext uri="{FF2B5EF4-FFF2-40B4-BE49-F238E27FC236}">
+                <a16:creationId xmlns:a16="http://schemas.microsoft.com/office/drawing/2014/main" id="{E513D254-D71C-074B-9309-FCD5B78CB170}"/>
+              </a:ext>
+            </a:extLst>
+          </p:cNvPr>
+          <p:cNvSpPr txBox="1"/>
+          <p:nvPr/>
+        </p:nvSpPr>
+        <p:spPr>
+          <a:xfrm>
+            <a:off x="838200" y="1452224"/>
+            <a:ext cx="4479235" cy="369332"/>
+          </a:xfrm>
+          <a:prstGeom prst="rect">
+            <a:avLst/>
+          </a:prstGeom>
+          <a:noFill/>
+          <a:ln>
+            <a:noFill/>
+          </a:ln>
+        </p:spPr>
+        <p:style>
+          <a:lnRef idx="2">
+            <a:schemeClr val="accent1">
+              <a:shade val="50000"/>
+            </a:schemeClr>
+          </a:lnRef>
+          <a:fillRef idx="1">
+            <a:schemeClr val="accent1"/>
+          </a:fillRef>
+          <a:effectRef idx="0">
+            <a:schemeClr val="accent1"/>
+          </a:effectRef>
+          <a:fontRef idx="minor">
+            <a:schemeClr val="lt1"/>
+          </a:fontRef>
+        </p:style>
+        <p:txBody>
+          <a:bodyPr rot="0" spcFirstLastPara="0" vertOverflow="overflow" horzOverflow="overflow" vert="horz" wrap="square" lIns="91440" tIns="45720" rIns="91440" bIns="45720" numCol="1" spcCol="0" rtlCol="0" fromWordArt="0" anchor="ctr" anchorCtr="0" forceAA="0" compatLnSpc="1">
+            <a:prstTxWarp prst="textNoShape">
+              <a:avLst/>
+            </a:prstTxWarp>
+            <a:spAutoFit/>
+          </a:bodyPr>
+          <a:lstStyle/>
+          <a:p>
+            <a:pPr algn="l"/>
+            <a:r>
+              <a:rPr lang="en-US" b="1" dirty="0">
+                <a:solidFill>
+                  <a:schemeClr val="tx1"/>
+                </a:solidFill>
+              </a:rPr>
+              <a:t>Example: </a:t>
+            </a:r>
+            <a:r>
+              <a:rPr lang="en-US" b="1" dirty="0" err="1">
+                <a:solidFill>
+                  <a:schemeClr val="tx1"/>
+                </a:solidFill>
+              </a:rPr>
+              <a:t>Valgrind</a:t>
+            </a:r>
+            <a:r>
+              <a:rPr lang="en-US" b="1" dirty="0">
+                <a:solidFill>
+                  <a:schemeClr val="tx1"/>
+                </a:solidFill>
+              </a:rPr>
+              <a:t> for C/C++ Memory Errors</a:t>
+            </a:r>
+          </a:p>
+        </p:txBody>
+      </p:sp>
+    </p:spTree>
+    <p:extLst>
+      <p:ext uri="{BB962C8B-B14F-4D97-AF65-F5344CB8AC3E}">
+        <p14:creationId xmlns:p14="http://schemas.microsoft.com/office/powerpoint/2010/main" val="1217014056"/>
+      </p:ext>
+    </p:extLst>
+  </p:cSld>
+  <p:clrMapOvr>
+    <a:masterClrMapping/>
+  </p:clrMapOvr>
+</p:sld>
+</file>
+
+<file path=ppt/slides/slide15.xml><?xml version="1.0" encoding="utf-8"?>
+<p:sld xmlns:a="http://schemas.openxmlformats.org/drawingml/2006/main" xmlns:r="http://schemas.openxmlformats.org/officeDocument/2006/relationships" xmlns:p="http://schemas.openxmlformats.org/presentationml/2006/main">
+  <p:cSld>
+    <p:spTree>
+      <p:nvGrpSpPr>
+        <p:cNvPr id="1" name=""/>
+        <p:cNvGrpSpPr/>
+        <p:nvPr/>
+      </p:nvGrpSpPr>
+      <p:grpSpPr>
+        <a:xfrm>
+          <a:off x="0" y="0"/>
+          <a:ext cx="0" cy="0"/>
+          <a:chOff x="0" y="0"/>
+          <a:chExt cx="0" cy="0"/>
+        </a:xfrm>
+      </p:grpSpPr>
+      <p:sp>
+        <p:nvSpPr>
+          <p:cNvPr id="2" name="Title 1">
+            <a:extLst>
+              <a:ext uri="{FF2B5EF4-FFF2-40B4-BE49-F238E27FC236}">
+                <a16:creationId xmlns:a16="http://schemas.microsoft.com/office/drawing/2014/main" id="{C39BD4A7-BD4F-A742-BC54-4A55B5BB2076}"/>
+              </a:ext>
+            </a:extLst>
+          </p:cNvPr>
+          <p:cNvSpPr>
+            <a:spLocks noGrp="1"/>
+          </p:cNvSpPr>
+          <p:nvPr>
+            <p:ph type="title"/>
+          </p:nvPr>
+        </p:nvSpPr>
+        <p:spPr/>
+        <p:txBody>
+          <a:bodyPr/>
+          <a:lstStyle/>
+          <a:p>
+            <a:r>
+              <a:rPr lang="en-US" dirty="0"/>
+              <a:t>Set Yourself Up For Debugging Success</a:t>
+            </a:r>
+          </a:p>
+        </p:txBody>
+      </p:sp>
+      <p:sp>
+        <p:nvSpPr>
+          <p:cNvPr id="3" name="Content Placeholder 2">
+            <a:extLst>
+              <a:ext uri="{FF2B5EF4-FFF2-40B4-BE49-F238E27FC236}">
+                <a16:creationId xmlns:a16="http://schemas.microsoft.com/office/drawing/2014/main" id="{5DACCFB5-E0B9-FE45-9303-B340C72E42A6}"/>
+              </a:ext>
+            </a:extLst>
+          </p:cNvPr>
+          <p:cNvSpPr>
+            <a:spLocks noGrp="1"/>
+          </p:cNvSpPr>
+          <p:nvPr>
+            <p:ph idx="1"/>
+          </p:nvPr>
+        </p:nvSpPr>
+        <p:spPr/>
+        <p:txBody>
+          <a:bodyPr/>
+          <a:lstStyle/>
+          <a:p>
+            <a:r>
+              <a:rPr lang="en-US" dirty="0"/>
+              <a:t>Invest in growing your experience of applying these debugging strategies</a:t>
+            </a:r>
+          </a:p>
+          <a:p>
+            <a:r>
+              <a:rPr lang="en-US" dirty="0"/>
+              <a:t>For complex problems:</a:t>
+            </a:r>
+          </a:p>
+          <a:p>
+            <a:pPr lvl="1"/>
+            <a:r>
+              <a:rPr lang="en-US" dirty="0"/>
+              <a:t>Consider each of these debugging strategies</a:t>
+            </a:r>
+          </a:p>
+          <a:p>
+            <a:pPr lvl="1"/>
+            <a:r>
+              <a:rPr lang="en-US" dirty="0"/>
+              <a:t>Use a notebook to keep track of what you’ve tried</a:t>
+            </a:r>
+          </a:p>
+          <a:p>
+            <a:pPr lvl="1"/>
+            <a:r>
+              <a:rPr lang="en-US" dirty="0"/>
+              <a:t>Take a break! Do not spend more than a few hours at a time in a debugging session</a:t>
+            </a:r>
+          </a:p>
+          <a:p>
+            <a:pPr lvl="1"/>
+            <a:r>
+              <a:rPr lang="en-US" dirty="0"/>
+              <a:t>Be persistent</a:t>
+            </a:r>
+          </a:p>
+        </p:txBody>
+      </p:sp>
+      <p:sp>
+        <p:nvSpPr>
+          <p:cNvPr id="4" name="Slide Number Placeholder 3">
+            <a:extLst>
+              <a:ext uri="{FF2B5EF4-FFF2-40B4-BE49-F238E27FC236}">
+                <a16:creationId xmlns:a16="http://schemas.microsoft.com/office/drawing/2014/main" id="{DD85BB1F-EB8B-424E-85BD-CE3BCE2E121E}"/>
+              </a:ext>
+            </a:extLst>
+          </p:cNvPr>
+          <p:cNvSpPr>
+            <a:spLocks noGrp="1"/>
+          </p:cNvSpPr>
+          <p:nvPr>
+            <p:ph type="sldNum" sz="quarter" idx="12"/>
+          </p:nvPr>
+        </p:nvSpPr>
+        <p:spPr/>
+        <p:txBody>
+          <a:bodyPr/>
+          <a:lstStyle/>
+          <a:p>
+            <a:fld id="{20F37917-FD3A-4669-9018-DA04BCDD3D75}" type="slidenum">
+              <a:rPr lang="en-US" smtClean="0"/>
+              <a:t>15</a:t>
+            </a:fld>
+            <a:endParaRPr lang="en-US"/>
+          </a:p>
+        </p:txBody>
+      </p:sp>
+    </p:spTree>
+    <p:extLst>
+      <p:ext uri="{BB962C8B-B14F-4D97-AF65-F5344CB8AC3E}">
+        <p14:creationId xmlns:p14="http://schemas.microsoft.com/office/powerpoint/2010/main" val="842198226"/>
+      </p:ext>
+    </p:extLst>
+  </p:cSld>
+  <p:clrMapOvr>
+    <a:masterClrMapping/>
+  </p:clrMapOvr>
+</p:sld>
+</file>
+
+<file path=ppt/slides/slide16.xml><?xml version="1.0" encoding="utf-8"?>
+<p:sld xmlns:a="http://schemas.openxmlformats.org/drawingml/2006/main" xmlns:r="http://schemas.openxmlformats.org/officeDocument/2006/relationships" xmlns:p="http://schemas.openxmlformats.org/presentationml/2006/main">
+  <p:cSld>
+    <p:spTree>
+      <p:nvGrpSpPr>
+        <p:cNvPr id="1" name=""/>
+        <p:cNvGrpSpPr/>
+        <p:nvPr/>
+      </p:nvGrpSpPr>
+      <p:grpSpPr>
+        <a:xfrm>
+          <a:off x="0" y="0"/>
+          <a:ext cx="0" cy="0"/>
+          <a:chOff x="0" y="0"/>
+          <a:chExt cx="0" cy="0"/>
+        </a:xfrm>
+      </p:grpSpPr>
+      <p:sp>
+        <p:nvSpPr>
+          <p:cNvPr id="2" name="Title 1">
+            <a:extLst>
+              <a:ext uri="{FF2B5EF4-FFF2-40B4-BE49-F238E27FC236}">
                 <a16:creationId xmlns:a16="http://schemas.microsoft.com/office/drawing/2014/main" id="{B6D33575-0593-49FD-831F-131BB6CC7E6C}"/>
               </a:ext>
             </a:extLst>
@@ -8308,16 +11046,22 @@
           <a:p>
             <a:r>
               <a:rPr lang="en-US" dirty="0"/>
-              <a:t>You should now be able to:</a:t>
-            </a:r>
-          </a:p>
-          <a:p>
-            <a:pPr lvl="2"/>
-            <a:endParaRPr lang="en-US" dirty="0"/>
+              <a:t>By the end of this lesson you should be able to:</a:t>
+            </a:r>
           </a:p>
           <a:p>
             <a:pPr lvl="1"/>
-            <a:endParaRPr lang="en-US" dirty="0"/>
+            <a:r>
+              <a:rPr lang="en-US" dirty="0"/>
+              <a:t>Understand the value of scientific debugging</a:t>
+            </a:r>
+          </a:p>
+          <a:p>
+            <a:pPr lvl="1"/>
+            <a:r>
+              <a:rPr lang="en-US" dirty="0"/>
+              <a:t>Enumerate general debugging strategies beyond “google it” or “turn it off and on again”</a:t>
+            </a:r>
           </a:p>
         </p:txBody>
       </p:sp>
@@ -8345,7 +11089,7 @@
             <a:fld id="{86CB4B4D-7CA3-9044-876B-883B54F8677D}" type="slidenum">
               <a:rPr lang="en-US" smtClean="0"/>
               <a:pPr/>
-              <a:t>12</a:t>
+              <a:t>16</a:t>
             </a:fld>
             <a:endParaRPr lang="en-US"/>
           </a:p>
@@ -8437,7 +11181,17 @@
           </a:p>
           <a:p>
             <a:pPr lvl="1"/>
-            <a:endParaRPr lang="en-US" dirty="0"/>
+            <a:r>
+              <a:rPr lang="en-US" dirty="0"/>
+              <a:t>Understand the value of scientific debugging</a:t>
+            </a:r>
+          </a:p>
+          <a:p>
+            <a:pPr lvl="1"/>
+            <a:r>
+              <a:rPr lang="en-US" dirty="0"/>
+              <a:t>Enumerate general debugging strategies beyond “google it” or “turn it off and on again”</a:t>
+            </a:r>
           </a:p>
         </p:txBody>
       </p:sp>
@@ -8633,7 +11387,7 @@
           <p:nvPr/>
         </p:nvPicPr>
         <p:blipFill>
-          <a:blip r:embed="rId2">
+          <a:blip r:embed="rId3">
             <a:extLst>
               <a:ext uri="{28A0092B-C50C-407E-A947-70E740481C1C}">
                 <a14:useLocalDpi xmlns:a14="http://schemas.microsoft.com/office/drawing/2010/main" val="0"/>
@@ -9599,7 +12353,7 @@
         </p:spPr>
         <p:txBody>
           <a:bodyPr>
-            <a:normAutofit lnSpcReduction="10000"/>
+            <a:normAutofit/>
           </a:bodyPr>
           <a:lstStyle/>
           <a:p>
@@ -9646,7 +12400,15 @@
           <a:p>
             <a:r>
               <a:rPr lang="en-US" sz="2100" dirty="0"/>
-              <a:t>The TAs will ask you this information if you ask for help debugging, so save a step!</a:t>
+              <a:t>Do this in an issue tracker, </a:t>
+            </a:r>
+            <a:r>
+              <a:rPr lang="en-US" sz="2100"/>
+              <a:t>or even in </a:t>
+            </a:r>
+            <a:r>
+              <a:rPr lang="en-US" sz="2100" dirty="0"/>
+              <a:t>a personal note</a:t>
             </a:r>
           </a:p>
         </p:txBody>

</xml_diff>